<commit_message>
Force Field Implementation in progress ...
</commit_message>
<xml_diff>
--- a/Force Field Transformation.pptx
+++ b/Force Field Transformation.pptx
@@ -208,7 +208,7 @@
           <a:p>
             <a:fld id="{2D375E8E-D067-40BE-8067-60BEC63713A2}" type="datetimeFigureOut">
               <a:rPr lang="en-GB" smtClean="0"/>
-              <a:t>02/02/2018</a:t>
+              <a:t>03/02/2018</a:t>
             </a:fld>
             <a:endParaRPr lang="en-GB"/>
           </a:p>
@@ -272,35 +272,35 @@
           <a:p>
             <a:pPr lvl="0"/>
             <a:r>
-              <a:rPr lang="de-DE" smtClean="0"/>
+              <a:rPr lang="de-DE"/>
               <a:t>Formatvorlagen des Textmasters bearbeiten</a:t>
             </a:r>
           </a:p>
           <a:p>
             <a:pPr lvl="1"/>
             <a:r>
-              <a:rPr lang="de-DE" smtClean="0"/>
+              <a:rPr lang="de-DE"/>
               <a:t>Zweite Ebene</a:t>
             </a:r>
           </a:p>
           <a:p>
             <a:pPr lvl="2"/>
             <a:r>
-              <a:rPr lang="de-DE" smtClean="0"/>
+              <a:rPr lang="de-DE"/>
               <a:t>Dritte Ebene</a:t>
             </a:r>
           </a:p>
           <a:p>
             <a:pPr lvl="3"/>
             <a:r>
-              <a:rPr lang="de-DE" smtClean="0"/>
+              <a:rPr lang="de-DE"/>
               <a:t>Vierte Ebene</a:t>
             </a:r>
           </a:p>
           <a:p>
             <a:pPr lvl="4"/>
             <a:r>
-              <a:rPr lang="de-DE" smtClean="0"/>
+              <a:rPr lang="de-DE"/>
               <a:t>Fünfte Ebene</a:t>
             </a:r>
             <a:endParaRPr lang="en-GB"/>
@@ -367,7 +367,7 @@
           <a:p>
             <a:fld id="{EF2D93C9-B2FF-4D76-8851-D84BA33B2773}" type="slidenum">
               <a:rPr lang="en-GB" smtClean="0"/>
-              <a:t>‹Nr.›</a:t>
+              <a:t>‹#›</a:t>
             </a:fld>
             <a:endParaRPr lang="en-GB"/>
           </a:p>
@@ -525,7 +525,7 @@
               <a:buChar char="•"/>
             </a:pPr>
             <a:r>
-              <a:rPr lang="en-GB" dirty="0" smtClean="0"/>
+              <a:rPr lang="en-GB" dirty="0"/>
               <a:t>Objective:</a:t>
             </a:r>
           </a:p>
@@ -535,7 +535,7 @@
               <a:buChar char="•"/>
             </a:pPr>
             <a:r>
-              <a:rPr lang="en-GB" dirty="0" smtClean="0"/>
+              <a:rPr lang="en-GB" dirty="0"/>
               <a:t>reduce dimensionality of pattern space</a:t>
             </a:r>
           </a:p>
@@ -545,7 +545,7 @@
               <a:buChar char="•"/>
             </a:pPr>
             <a:r>
-              <a:rPr lang="en-GB" dirty="0" smtClean="0"/>
+              <a:rPr lang="en-GB" dirty="0"/>
               <a:t>yet maintain discriminator power for classification and invariant description</a:t>
             </a:r>
           </a:p>
@@ -555,7 +555,7 @@
               <a:buChar char="•"/>
             </a:pPr>
             <a:r>
-              <a:rPr lang="en-GB" dirty="0" smtClean="0"/>
+              <a:rPr lang="en-GB" dirty="0"/>
               <a:t>Used/invented by … for ear biometric</a:t>
             </a:r>
           </a:p>
@@ -649,7 +649,7 @@
               <a:buAutoNum type="arabicPeriod"/>
             </a:pPr>
             <a:r>
-              <a:rPr lang="en-GB" dirty="0" smtClean="0"/>
+              <a:rPr lang="en-GB" dirty="0"/>
               <a:t>Approaches:</a:t>
             </a:r>
           </a:p>
@@ -659,14 +659,14 @@
               <a:buAutoNum type="arabicPeriod"/>
             </a:pPr>
             <a:r>
-              <a:rPr lang="en-GB" dirty="0" smtClean="0"/>
+              <a:rPr lang="en-GB" dirty="0"/>
               <a:t>Brute Force:</a:t>
             </a:r>
             <a:br>
-              <a:rPr lang="en-GB" dirty="0" smtClean="0"/>
+              <a:rPr lang="en-GB" dirty="0"/>
             </a:br>
             <a:r>
-              <a:rPr lang="en-GB" dirty="0" smtClean="0"/>
+              <a:rPr lang="en-GB" dirty="0"/>
               <a:t>Each pixel is transformed using the Energy &amp; Force equations</a:t>
             </a:r>
           </a:p>
@@ -676,14 +676,14 @@
               <a:buAutoNum type="arabicPeriod"/>
             </a:pPr>
             <a:r>
-              <a:rPr lang="en-GB" dirty="0" smtClean="0"/>
+              <a:rPr lang="en-GB" dirty="0"/>
               <a:t>Frequency Domain Analysis: </a:t>
             </a:r>
             <a:br>
-              <a:rPr lang="en-GB" dirty="0" smtClean="0"/>
+              <a:rPr lang="en-GB" dirty="0"/>
             </a:br>
             <a:r>
-              <a:rPr lang="en-GB" dirty="0" smtClean="0"/>
+              <a:rPr lang="en-GB" dirty="0"/>
               <a:t>Fourier Transform etc. and then equations applied</a:t>
             </a:r>
           </a:p>
@@ -774,14 +774,14 @@
           <a:p>
             <a:pPr lvl="0"/>
             <a:r>
-              <a:rPr lang="en-GB" dirty="0" smtClean="0"/>
+              <a:rPr lang="en-GB" dirty="0"/>
               <a:t>Assumption: (for mathematical convenience):</a:t>
             </a:r>
             <a:br>
-              <a:rPr lang="en-GB" dirty="0" smtClean="0"/>
+              <a:rPr lang="en-GB" dirty="0"/>
             </a:br>
             <a:r>
-              <a:rPr lang="en-GB" dirty="0" smtClean="0"/>
+              <a:rPr lang="en-GB" dirty="0"/>
               <a:t>Each pixel exerts an isotropic force on all the other pixels (they represent attractive particles, that act as the source of a spherically symmetric force field) that is proportional to pixel intensity and inversely proportional to the square of the distance, i.e. the inverse square law</a:t>
             </a:r>
           </a:p>
@@ -872,14 +872,14 @@
           <a:p>
             <a:pPr lvl="0"/>
             <a:r>
-              <a:rPr lang="en-GB" dirty="0" smtClean="0"/>
+              <a:rPr lang="en-GB" dirty="0"/>
               <a:t>Assumption: (for mathematical convenience):</a:t>
             </a:r>
             <a:br>
-              <a:rPr lang="en-GB" dirty="0" smtClean="0"/>
+              <a:rPr lang="en-GB" dirty="0"/>
             </a:br>
             <a:r>
-              <a:rPr lang="en-GB" dirty="0" smtClean="0"/>
+              <a:rPr lang="en-GB" dirty="0"/>
               <a:t>Each pixel exerts an isotropic force on all the other pixels (they represent attractive particles, that act as the source of a spherically symmetric force field) that is proportional to pixel intensity and inversely proportional to the square of the distance, i.e. the inverse square law</a:t>
             </a:r>
           </a:p>
@@ -966,7 +966,7 @@
           </a:lstStyle>
           <a:p>
             <a:r>
-              <a:rPr lang="de-DE" smtClean="0"/>
+              <a:rPr lang="de-DE"/>
               <a:t>Titelmasterformat durch Klicken bearbeiten</a:t>
             </a:r>
             <a:endParaRPr lang="en-US" dirty="0"/>
@@ -1031,7 +1031,7 @@
           </a:lstStyle>
           <a:p>
             <a:r>
-              <a:rPr lang="de-DE" dirty="0" smtClean="0"/>
+              <a:rPr lang="de-DE" dirty="0"/>
               <a:t>Formatvorlage des Untertitelmasters durch Klicken bearbeiten</a:t>
             </a:r>
             <a:endParaRPr lang="en-US" dirty="0"/>
@@ -1054,7 +1054,7 @@
           <a:lstStyle/>
           <a:p>
             <a:r>
-              <a:rPr lang="en-US" smtClean="0"/>
+              <a:rPr lang="en-US"/>
               <a:t>Ganiyu Ibraheem  Philipp Seybold</a:t>
             </a:r>
             <a:endParaRPr lang="en-GB" dirty="0"/>
@@ -1077,10 +1077,9 @@
           <a:lstStyle/>
           <a:p>
             <a:r>
-              <a:rPr lang="en-GB" dirty="0" smtClean="0"/>
+              <a:rPr lang="en-GB" dirty="0"/>
               <a:t>COMP6206 Advanced Computer Vision</a:t>
             </a:r>
-            <a:endParaRPr lang="en-GB" dirty="0"/>
           </a:p>
         </p:txBody>
       </p:sp>
@@ -1101,7 +1100,7 @@
           <a:p>
             <a:fld id="{FB9D3F8E-99BC-4812-95D4-548B8E992B94}" type="slidenum">
               <a:rPr lang="en-GB" smtClean="0"/>
-              <a:t>‹Nr.›</a:t>
+              <a:t>‹#›</a:t>
             </a:fld>
             <a:endParaRPr lang="en-GB"/>
           </a:p>
@@ -1117,13 +1116,6 @@
   <p:clrMapOvr>
     <a:masterClrMapping/>
   </p:clrMapOvr>
-  <p:timing>
-    <p:tnLst>
-      <p:par>
-        <p:cTn id="1" dur="indefinite" restart="never" nodeType="tmRoot"/>
-      </p:par>
-    </p:tnLst>
-  </p:timing>
 </p:sldLayout>
 </file>
 
@@ -1160,7 +1152,7 @@
           <a:lstStyle/>
           <a:p>
             <a:r>
-              <a:rPr lang="de-DE" smtClean="0"/>
+              <a:rPr lang="de-DE"/>
               <a:t>Titelmasterformat durch Klicken bearbeiten</a:t>
             </a:r>
             <a:endParaRPr lang="en-US" dirty="0"/>
@@ -1184,35 +1176,35 @@
           <a:p>
             <a:pPr lvl="0"/>
             <a:r>
-              <a:rPr lang="de-DE" smtClean="0"/>
+              <a:rPr lang="de-DE"/>
               <a:t>Formatvorlagen des Textmasters bearbeiten</a:t>
             </a:r>
           </a:p>
           <a:p>
             <a:pPr lvl="1"/>
             <a:r>
-              <a:rPr lang="de-DE" smtClean="0"/>
+              <a:rPr lang="de-DE"/>
               <a:t>Zweite Ebene</a:t>
             </a:r>
           </a:p>
           <a:p>
             <a:pPr lvl="2"/>
             <a:r>
-              <a:rPr lang="de-DE" smtClean="0"/>
+              <a:rPr lang="de-DE"/>
               <a:t>Dritte Ebene</a:t>
             </a:r>
           </a:p>
           <a:p>
             <a:pPr lvl="3"/>
             <a:r>
-              <a:rPr lang="de-DE" smtClean="0"/>
+              <a:rPr lang="de-DE"/>
               <a:t>Vierte Ebene</a:t>
             </a:r>
           </a:p>
           <a:p>
             <a:pPr lvl="4"/>
             <a:r>
-              <a:rPr lang="de-DE" smtClean="0"/>
+              <a:rPr lang="de-DE"/>
               <a:t>Fünfte Ebene</a:t>
             </a:r>
             <a:endParaRPr lang="en-US" dirty="0"/>
@@ -1235,7 +1227,7 @@
           <a:lstStyle/>
           <a:p>
             <a:r>
-              <a:rPr lang="en-US" smtClean="0"/>
+              <a:rPr lang="en-US"/>
               <a:t>Ganiyu Ibraheem  Philipp Seybold</a:t>
             </a:r>
             <a:endParaRPr lang="en-GB"/>
@@ -1258,10 +1250,9 @@
           <a:lstStyle/>
           <a:p>
             <a:r>
-              <a:rPr lang="en-GB" smtClean="0"/>
+              <a:rPr lang="en-GB"/>
               <a:t>COMP6206 Advanced Computer Vision</a:t>
             </a:r>
-            <a:endParaRPr lang="en-GB"/>
           </a:p>
         </p:txBody>
       </p:sp>
@@ -1282,7 +1273,7 @@
           <a:p>
             <a:fld id="{FB9D3F8E-99BC-4812-95D4-548B8E992B94}" type="slidenum">
               <a:rPr lang="en-GB" smtClean="0"/>
-              <a:t>‹Nr.›</a:t>
+              <a:t>‹#›</a:t>
             </a:fld>
             <a:endParaRPr lang="en-GB"/>
           </a:p>
@@ -1298,13 +1289,6 @@
   <p:clrMapOvr>
     <a:masterClrMapping/>
   </p:clrMapOvr>
-  <p:timing>
-    <p:tnLst>
-      <p:par>
-        <p:cTn id="1" dur="indefinite" restart="never" nodeType="tmRoot"/>
-      </p:par>
-    </p:tnLst>
-  </p:timing>
 </p:sldLayout>
 </file>
 
@@ -1346,7 +1330,7 @@
           <a:lstStyle/>
           <a:p>
             <a:r>
-              <a:rPr lang="de-DE" smtClean="0"/>
+              <a:rPr lang="de-DE"/>
               <a:t>Titelmasterformat durch Klicken bearbeiten</a:t>
             </a:r>
             <a:endParaRPr lang="en-US" dirty="0"/>
@@ -1375,35 +1359,35 @@
           <a:p>
             <a:pPr lvl="0"/>
             <a:r>
-              <a:rPr lang="de-DE" smtClean="0"/>
+              <a:rPr lang="de-DE"/>
               <a:t>Formatvorlagen des Textmasters bearbeiten</a:t>
             </a:r>
           </a:p>
           <a:p>
             <a:pPr lvl="1"/>
             <a:r>
-              <a:rPr lang="de-DE" smtClean="0"/>
+              <a:rPr lang="de-DE"/>
               <a:t>Zweite Ebene</a:t>
             </a:r>
           </a:p>
           <a:p>
             <a:pPr lvl="2"/>
             <a:r>
-              <a:rPr lang="de-DE" smtClean="0"/>
+              <a:rPr lang="de-DE"/>
               <a:t>Dritte Ebene</a:t>
             </a:r>
           </a:p>
           <a:p>
             <a:pPr lvl="3"/>
             <a:r>
-              <a:rPr lang="de-DE" smtClean="0"/>
+              <a:rPr lang="de-DE"/>
               <a:t>Vierte Ebene</a:t>
             </a:r>
           </a:p>
           <a:p>
             <a:pPr lvl="4"/>
             <a:r>
-              <a:rPr lang="de-DE" smtClean="0"/>
+              <a:rPr lang="de-DE"/>
               <a:t>Fünfte Ebene</a:t>
             </a:r>
             <a:endParaRPr lang="en-US" dirty="0"/>
@@ -1426,7 +1410,7 @@
           <a:lstStyle/>
           <a:p>
             <a:r>
-              <a:rPr lang="en-US" smtClean="0"/>
+              <a:rPr lang="en-US"/>
               <a:t>Ganiyu Ibraheem  Philipp Seybold</a:t>
             </a:r>
             <a:endParaRPr lang="en-GB"/>
@@ -1449,10 +1433,9 @@
           <a:lstStyle/>
           <a:p>
             <a:r>
-              <a:rPr lang="en-GB" smtClean="0"/>
+              <a:rPr lang="en-GB"/>
               <a:t>COMP6206 Advanced Computer Vision</a:t>
             </a:r>
-            <a:endParaRPr lang="en-GB"/>
           </a:p>
         </p:txBody>
       </p:sp>
@@ -1473,7 +1456,7 @@
           <a:p>
             <a:fld id="{FB9D3F8E-99BC-4812-95D4-548B8E992B94}" type="slidenum">
               <a:rPr lang="en-GB" smtClean="0"/>
-              <a:t>‹Nr.›</a:t>
+              <a:t>‹#›</a:t>
             </a:fld>
             <a:endParaRPr lang="en-GB"/>
           </a:p>
@@ -1536,7 +1519,7 @@
           </a:lstStyle>
           <a:p>
             <a:r>
-              <a:rPr lang="de-DE" dirty="0" smtClean="0"/>
+              <a:rPr lang="de-DE" dirty="0"/>
               <a:t>Titelmasterformat</a:t>
             </a:r>
             <a:endParaRPr lang="en-US" dirty="0"/>
@@ -1565,35 +1548,35 @@
           <a:p>
             <a:pPr lvl="0"/>
             <a:r>
-              <a:rPr lang="de-DE" dirty="0" smtClean="0"/>
+              <a:rPr lang="de-DE" dirty="0"/>
               <a:t>Formatvorlagen des Textmasters bearbeiten</a:t>
             </a:r>
           </a:p>
           <a:p>
             <a:pPr lvl="1"/>
             <a:r>
-              <a:rPr lang="de-DE" dirty="0" smtClean="0"/>
+              <a:rPr lang="de-DE" dirty="0"/>
               <a:t>Zweite Ebene</a:t>
             </a:r>
           </a:p>
           <a:p>
             <a:pPr lvl="2"/>
             <a:r>
-              <a:rPr lang="de-DE" dirty="0" smtClean="0"/>
+              <a:rPr lang="de-DE" dirty="0"/>
               <a:t>Dritte Ebene</a:t>
             </a:r>
           </a:p>
           <a:p>
             <a:pPr lvl="3"/>
             <a:r>
-              <a:rPr lang="de-DE" dirty="0" smtClean="0"/>
+              <a:rPr lang="de-DE" dirty="0"/>
               <a:t>Vierte Ebene</a:t>
             </a:r>
           </a:p>
           <a:p>
             <a:pPr lvl="4"/>
             <a:r>
-              <a:rPr lang="de-DE" dirty="0" smtClean="0"/>
+              <a:rPr lang="de-DE" dirty="0"/>
               <a:t>Fünfte Ebene</a:t>
             </a:r>
             <a:endParaRPr lang="en-US" dirty="0"/>
@@ -1616,7 +1599,7 @@
           <a:lstStyle/>
           <a:p>
             <a:r>
-              <a:rPr lang="en-US" smtClean="0"/>
+              <a:rPr lang="en-US"/>
               <a:t>Ganiyu Ibraheem  Philipp Seybold</a:t>
             </a:r>
             <a:endParaRPr lang="en-GB" dirty="0"/>
@@ -1639,10 +1622,9 @@
           <a:lstStyle/>
           <a:p>
             <a:r>
-              <a:rPr lang="en-GB" smtClean="0"/>
+              <a:rPr lang="en-GB"/>
               <a:t>COMP6206 Advanced Computer Vision</a:t>
             </a:r>
-            <a:endParaRPr lang="en-GB"/>
           </a:p>
         </p:txBody>
       </p:sp>
@@ -1663,7 +1645,7 @@
           <a:p>
             <a:fld id="{FB9D3F8E-99BC-4812-95D4-548B8E992B94}" type="slidenum">
               <a:rPr lang="en-GB" smtClean="0"/>
-              <a:t>‹Nr.›</a:t>
+              <a:t>‹#›</a:t>
             </a:fld>
             <a:endParaRPr lang="en-GB"/>
           </a:p>
@@ -1709,13 +1691,6 @@
   <p:clrMapOvr>
     <a:masterClrMapping/>
   </p:clrMapOvr>
-  <p:timing>
-    <p:tnLst>
-      <p:par>
-        <p:cTn id="1" dur="indefinite" restart="never" nodeType="tmRoot"/>
-      </p:par>
-    </p:tnLst>
-  </p:timing>
 </p:sldLayout>
 </file>
 
@@ -1761,7 +1736,7 @@
           </a:lstStyle>
           <a:p>
             <a:r>
-              <a:rPr lang="de-DE" smtClean="0"/>
+              <a:rPr lang="de-DE"/>
               <a:t>Titelmasterformat durch Klicken bearbeiten</a:t>
             </a:r>
             <a:endParaRPr lang="en-US" dirty="0"/>
@@ -1879,7 +1854,7 @@
           <a:p>
             <a:pPr lvl="0"/>
             <a:r>
-              <a:rPr lang="de-DE" smtClean="0"/>
+              <a:rPr lang="de-DE"/>
               <a:t>Formatvorlagen des Textmasters bearbeiten</a:t>
             </a:r>
           </a:p>
@@ -1901,7 +1876,7 @@
           <a:lstStyle/>
           <a:p>
             <a:r>
-              <a:rPr lang="en-US" smtClean="0"/>
+              <a:rPr lang="en-US"/>
               <a:t>Ganiyu Ibraheem  Philipp Seybold</a:t>
             </a:r>
             <a:endParaRPr lang="en-GB"/>
@@ -1924,10 +1899,9 @@
           <a:lstStyle/>
           <a:p>
             <a:r>
-              <a:rPr lang="en-GB" smtClean="0"/>
+              <a:rPr lang="en-GB"/>
               <a:t>COMP6206 Advanced Computer Vision</a:t>
             </a:r>
-            <a:endParaRPr lang="en-GB"/>
           </a:p>
         </p:txBody>
       </p:sp>
@@ -1948,7 +1922,7 @@
           <a:p>
             <a:fld id="{FB9D3F8E-99BC-4812-95D4-548B8E992B94}" type="slidenum">
               <a:rPr lang="en-GB" smtClean="0"/>
-              <a:t>‹Nr.›</a:t>
+              <a:t>‹#›</a:t>
             </a:fld>
             <a:endParaRPr lang="en-GB"/>
           </a:p>
@@ -1964,13 +1938,6 @@
   <p:clrMapOvr>
     <a:masterClrMapping/>
   </p:clrMapOvr>
-  <p:timing>
-    <p:tnLst>
-      <p:par>
-        <p:cTn id="1" dur="indefinite" restart="never" nodeType="tmRoot"/>
-      </p:par>
-    </p:tnLst>
-  </p:timing>
 </p:sldLayout>
 </file>
 
@@ -2007,7 +1974,7 @@
           <a:lstStyle/>
           <a:p>
             <a:r>
-              <a:rPr lang="de-DE" smtClean="0"/>
+              <a:rPr lang="de-DE"/>
               <a:t>Titelmasterformat durch Klicken bearbeiten</a:t>
             </a:r>
             <a:endParaRPr lang="en-US" dirty="0"/>
@@ -2036,35 +2003,35 @@
           <a:p>
             <a:pPr lvl="0"/>
             <a:r>
-              <a:rPr lang="de-DE" smtClean="0"/>
+              <a:rPr lang="de-DE"/>
               <a:t>Formatvorlagen des Textmasters bearbeiten</a:t>
             </a:r>
           </a:p>
           <a:p>
             <a:pPr lvl="1"/>
             <a:r>
-              <a:rPr lang="de-DE" smtClean="0"/>
+              <a:rPr lang="de-DE"/>
               <a:t>Zweite Ebene</a:t>
             </a:r>
           </a:p>
           <a:p>
             <a:pPr lvl="2"/>
             <a:r>
-              <a:rPr lang="de-DE" smtClean="0"/>
+              <a:rPr lang="de-DE"/>
               <a:t>Dritte Ebene</a:t>
             </a:r>
           </a:p>
           <a:p>
             <a:pPr lvl="3"/>
             <a:r>
-              <a:rPr lang="de-DE" smtClean="0"/>
+              <a:rPr lang="de-DE"/>
               <a:t>Vierte Ebene</a:t>
             </a:r>
           </a:p>
           <a:p>
             <a:pPr lvl="4"/>
             <a:r>
-              <a:rPr lang="de-DE" smtClean="0"/>
+              <a:rPr lang="de-DE"/>
               <a:t>Fünfte Ebene</a:t>
             </a:r>
             <a:endParaRPr lang="en-US" dirty="0"/>
@@ -2093,35 +2060,35 @@
           <a:p>
             <a:pPr lvl="0"/>
             <a:r>
-              <a:rPr lang="de-DE" smtClean="0"/>
+              <a:rPr lang="de-DE"/>
               <a:t>Formatvorlagen des Textmasters bearbeiten</a:t>
             </a:r>
           </a:p>
           <a:p>
             <a:pPr lvl="1"/>
             <a:r>
-              <a:rPr lang="de-DE" smtClean="0"/>
+              <a:rPr lang="de-DE"/>
               <a:t>Zweite Ebene</a:t>
             </a:r>
           </a:p>
           <a:p>
             <a:pPr lvl="2"/>
             <a:r>
-              <a:rPr lang="de-DE" smtClean="0"/>
+              <a:rPr lang="de-DE"/>
               <a:t>Dritte Ebene</a:t>
             </a:r>
           </a:p>
           <a:p>
             <a:pPr lvl="3"/>
             <a:r>
-              <a:rPr lang="de-DE" smtClean="0"/>
+              <a:rPr lang="de-DE"/>
               <a:t>Vierte Ebene</a:t>
             </a:r>
           </a:p>
           <a:p>
             <a:pPr lvl="4"/>
             <a:r>
-              <a:rPr lang="de-DE" smtClean="0"/>
+              <a:rPr lang="de-DE"/>
               <a:t>Fünfte Ebene</a:t>
             </a:r>
             <a:endParaRPr lang="en-US" dirty="0"/>
@@ -2144,7 +2111,7 @@
           <a:lstStyle/>
           <a:p>
             <a:r>
-              <a:rPr lang="en-US" smtClean="0"/>
+              <a:rPr lang="en-US"/>
               <a:t>Ganiyu Ibraheem  Philipp Seybold</a:t>
             </a:r>
             <a:endParaRPr lang="en-GB"/>
@@ -2167,10 +2134,9 @@
           <a:lstStyle/>
           <a:p>
             <a:r>
-              <a:rPr lang="en-GB" smtClean="0"/>
+              <a:rPr lang="en-GB"/>
               <a:t>COMP6206 Advanced Computer Vision</a:t>
             </a:r>
-            <a:endParaRPr lang="en-GB"/>
           </a:p>
         </p:txBody>
       </p:sp>
@@ -2191,7 +2157,7 @@
           <a:p>
             <a:fld id="{FB9D3F8E-99BC-4812-95D4-548B8E992B94}" type="slidenum">
               <a:rPr lang="en-GB" smtClean="0"/>
-              <a:t>‹Nr.›</a:t>
+              <a:t>‹#›</a:t>
             </a:fld>
             <a:endParaRPr lang="en-GB"/>
           </a:p>
@@ -2207,13 +2173,6 @@
   <p:clrMapOvr>
     <a:masterClrMapping/>
   </p:clrMapOvr>
-  <p:timing>
-    <p:tnLst>
-      <p:par>
-        <p:cTn id="1" dur="indefinite" restart="never" nodeType="tmRoot"/>
-      </p:par>
-    </p:tnLst>
-  </p:timing>
 </p:sldLayout>
 </file>
 
@@ -2255,7 +2214,7 @@
           <a:lstStyle/>
           <a:p>
             <a:r>
-              <a:rPr lang="de-DE" smtClean="0"/>
+              <a:rPr lang="de-DE"/>
               <a:t>Titelmasterformat durch Klicken bearbeiten</a:t>
             </a:r>
             <a:endParaRPr lang="en-US" dirty="0"/>
@@ -2321,7 +2280,7 @@
           <a:p>
             <a:pPr lvl="0"/>
             <a:r>
-              <a:rPr lang="de-DE" smtClean="0"/>
+              <a:rPr lang="de-DE"/>
               <a:t>Formatvorlagen des Textmasters bearbeiten</a:t>
             </a:r>
           </a:p>
@@ -2349,35 +2308,35 @@
           <a:p>
             <a:pPr lvl="0"/>
             <a:r>
-              <a:rPr lang="de-DE" smtClean="0"/>
+              <a:rPr lang="de-DE"/>
               <a:t>Formatvorlagen des Textmasters bearbeiten</a:t>
             </a:r>
           </a:p>
           <a:p>
             <a:pPr lvl="1"/>
             <a:r>
-              <a:rPr lang="de-DE" smtClean="0"/>
+              <a:rPr lang="de-DE"/>
               <a:t>Zweite Ebene</a:t>
             </a:r>
           </a:p>
           <a:p>
             <a:pPr lvl="2"/>
             <a:r>
-              <a:rPr lang="de-DE" smtClean="0"/>
+              <a:rPr lang="de-DE"/>
               <a:t>Dritte Ebene</a:t>
             </a:r>
           </a:p>
           <a:p>
             <a:pPr lvl="3"/>
             <a:r>
-              <a:rPr lang="de-DE" smtClean="0"/>
+              <a:rPr lang="de-DE"/>
               <a:t>Vierte Ebene</a:t>
             </a:r>
           </a:p>
           <a:p>
             <a:pPr lvl="4"/>
             <a:r>
-              <a:rPr lang="de-DE" smtClean="0"/>
+              <a:rPr lang="de-DE"/>
               <a:t>Fünfte Ebene</a:t>
             </a:r>
             <a:endParaRPr lang="en-US" dirty="0"/>
@@ -2443,7 +2402,7 @@
           <a:p>
             <a:pPr lvl="0"/>
             <a:r>
-              <a:rPr lang="de-DE" smtClean="0"/>
+              <a:rPr lang="de-DE"/>
               <a:t>Formatvorlagen des Textmasters bearbeiten</a:t>
             </a:r>
           </a:p>
@@ -2471,35 +2430,35 @@
           <a:p>
             <a:pPr lvl="0"/>
             <a:r>
-              <a:rPr lang="de-DE" smtClean="0"/>
+              <a:rPr lang="de-DE"/>
               <a:t>Formatvorlagen des Textmasters bearbeiten</a:t>
             </a:r>
           </a:p>
           <a:p>
             <a:pPr lvl="1"/>
             <a:r>
-              <a:rPr lang="de-DE" smtClean="0"/>
+              <a:rPr lang="de-DE"/>
               <a:t>Zweite Ebene</a:t>
             </a:r>
           </a:p>
           <a:p>
             <a:pPr lvl="2"/>
             <a:r>
-              <a:rPr lang="de-DE" smtClean="0"/>
+              <a:rPr lang="de-DE"/>
               <a:t>Dritte Ebene</a:t>
             </a:r>
           </a:p>
           <a:p>
             <a:pPr lvl="3"/>
             <a:r>
-              <a:rPr lang="de-DE" smtClean="0"/>
+              <a:rPr lang="de-DE"/>
               <a:t>Vierte Ebene</a:t>
             </a:r>
           </a:p>
           <a:p>
             <a:pPr lvl="4"/>
             <a:r>
-              <a:rPr lang="de-DE" smtClean="0"/>
+              <a:rPr lang="de-DE"/>
               <a:t>Fünfte Ebene</a:t>
             </a:r>
             <a:endParaRPr lang="en-US" dirty="0"/>
@@ -2522,7 +2481,7 @@
           <a:lstStyle/>
           <a:p>
             <a:r>
-              <a:rPr lang="en-US" smtClean="0"/>
+              <a:rPr lang="en-US"/>
               <a:t>Ganiyu Ibraheem  Philipp Seybold</a:t>
             </a:r>
             <a:endParaRPr lang="en-GB"/>
@@ -2545,10 +2504,9 @@
           <a:lstStyle/>
           <a:p>
             <a:r>
-              <a:rPr lang="en-GB" smtClean="0"/>
+              <a:rPr lang="en-GB"/>
               <a:t>COMP6206 Advanced Computer Vision</a:t>
             </a:r>
-            <a:endParaRPr lang="en-GB"/>
           </a:p>
         </p:txBody>
       </p:sp>
@@ -2569,7 +2527,7 @@
           <a:p>
             <a:fld id="{FB9D3F8E-99BC-4812-95D4-548B8E992B94}" type="slidenum">
               <a:rPr lang="en-GB" smtClean="0"/>
-              <a:t>‹Nr.›</a:t>
+              <a:t>‹#›</a:t>
             </a:fld>
             <a:endParaRPr lang="en-GB"/>
           </a:p>
@@ -2621,7 +2579,7 @@
           <a:lstStyle/>
           <a:p>
             <a:r>
-              <a:rPr lang="de-DE" smtClean="0"/>
+              <a:rPr lang="de-DE"/>
               <a:t>Titelmasterformat durch Klicken bearbeiten</a:t>
             </a:r>
             <a:endParaRPr lang="en-US" dirty="0"/>
@@ -2644,7 +2602,7 @@
           <a:lstStyle/>
           <a:p>
             <a:r>
-              <a:rPr lang="en-US" smtClean="0"/>
+              <a:rPr lang="en-US"/>
               <a:t>Ganiyu Ibraheem  Philipp Seybold</a:t>
             </a:r>
             <a:endParaRPr lang="en-GB"/>
@@ -2667,10 +2625,9 @@
           <a:lstStyle/>
           <a:p>
             <a:r>
-              <a:rPr lang="en-GB" smtClean="0"/>
+              <a:rPr lang="en-GB"/>
               <a:t>COMP6206 Advanced Computer Vision</a:t>
             </a:r>
-            <a:endParaRPr lang="en-GB"/>
           </a:p>
         </p:txBody>
       </p:sp>
@@ -2691,7 +2648,7 @@
           <a:p>
             <a:fld id="{FB9D3F8E-99BC-4812-95D4-548B8E992B94}" type="slidenum">
               <a:rPr lang="en-GB" smtClean="0"/>
-              <a:t>‹Nr.›</a:t>
+              <a:t>‹#›</a:t>
             </a:fld>
             <a:endParaRPr lang="en-GB"/>
           </a:p>
@@ -2743,7 +2700,7 @@
           <a:lstStyle/>
           <a:p>
             <a:r>
-              <a:rPr lang="en-US" smtClean="0"/>
+              <a:rPr lang="en-US"/>
               <a:t>Ganiyu Ibraheem  Philipp Seybold</a:t>
             </a:r>
             <a:endParaRPr lang="en-GB"/>
@@ -2766,10 +2723,9 @@
           <a:lstStyle/>
           <a:p>
             <a:r>
-              <a:rPr lang="en-GB" smtClean="0"/>
+              <a:rPr lang="en-GB"/>
               <a:t>COMP6206 Advanced Computer Vision</a:t>
             </a:r>
-            <a:endParaRPr lang="en-GB"/>
           </a:p>
         </p:txBody>
       </p:sp>
@@ -2790,7 +2746,7 @@
           <a:p>
             <a:fld id="{FB9D3F8E-99BC-4812-95D4-548B8E992B94}" type="slidenum">
               <a:rPr lang="en-GB" smtClean="0"/>
-              <a:t>‹Nr.›</a:t>
+              <a:t>‹#›</a:t>
             </a:fld>
             <a:endParaRPr lang="en-GB"/>
           </a:p>
@@ -2851,7 +2807,7 @@
           </a:lstStyle>
           <a:p>
             <a:r>
-              <a:rPr lang="de-DE" smtClean="0"/>
+              <a:rPr lang="de-DE"/>
               <a:t>Titelmasterformat durch Klicken bearbeiten</a:t>
             </a:r>
             <a:endParaRPr lang="en-US" dirty="0"/>
@@ -2908,35 +2864,35 @@
           <a:p>
             <a:pPr lvl="0"/>
             <a:r>
-              <a:rPr lang="de-DE" smtClean="0"/>
+              <a:rPr lang="de-DE"/>
               <a:t>Formatvorlagen des Textmasters bearbeiten</a:t>
             </a:r>
           </a:p>
           <a:p>
             <a:pPr lvl="1"/>
             <a:r>
-              <a:rPr lang="de-DE" smtClean="0"/>
+              <a:rPr lang="de-DE"/>
               <a:t>Zweite Ebene</a:t>
             </a:r>
           </a:p>
           <a:p>
             <a:pPr lvl="2"/>
             <a:r>
-              <a:rPr lang="de-DE" smtClean="0"/>
+              <a:rPr lang="de-DE"/>
               <a:t>Dritte Ebene</a:t>
             </a:r>
           </a:p>
           <a:p>
             <a:pPr lvl="3"/>
             <a:r>
-              <a:rPr lang="de-DE" smtClean="0"/>
+              <a:rPr lang="de-DE"/>
               <a:t>Vierte Ebene</a:t>
             </a:r>
           </a:p>
           <a:p>
             <a:pPr lvl="4"/>
             <a:r>
-              <a:rPr lang="de-DE" smtClean="0"/>
+              <a:rPr lang="de-DE"/>
               <a:t>Fünfte Ebene</a:t>
             </a:r>
             <a:endParaRPr lang="en-US" dirty="0"/>
@@ -3002,7 +2958,7 @@
           <a:p>
             <a:pPr lvl="0"/>
             <a:r>
-              <a:rPr lang="de-DE" smtClean="0"/>
+              <a:rPr lang="de-DE"/>
               <a:t>Formatvorlagen des Textmasters bearbeiten</a:t>
             </a:r>
           </a:p>
@@ -3024,7 +2980,7 @@
           <a:lstStyle/>
           <a:p>
             <a:r>
-              <a:rPr lang="en-US" smtClean="0"/>
+              <a:rPr lang="en-US"/>
               <a:t>Ganiyu Ibraheem  Philipp Seybold</a:t>
             </a:r>
             <a:endParaRPr lang="en-GB"/>
@@ -3047,10 +3003,9 @@
           <a:lstStyle/>
           <a:p>
             <a:r>
-              <a:rPr lang="en-GB" smtClean="0"/>
+              <a:rPr lang="en-GB"/>
               <a:t>COMP6206 Advanced Computer Vision</a:t>
             </a:r>
-            <a:endParaRPr lang="en-GB"/>
           </a:p>
         </p:txBody>
       </p:sp>
@@ -3071,7 +3026,7 @@
           <a:p>
             <a:fld id="{FB9D3F8E-99BC-4812-95D4-548B8E992B94}" type="slidenum">
               <a:rPr lang="en-GB" smtClean="0"/>
-              <a:t>‹Nr.›</a:t>
+              <a:t>‹#›</a:t>
             </a:fld>
             <a:endParaRPr lang="en-GB"/>
           </a:p>
@@ -3132,7 +3087,7 @@
           </a:lstStyle>
           <a:p>
             <a:r>
-              <a:rPr lang="de-DE" smtClean="0"/>
+              <a:rPr lang="de-DE"/>
               <a:t>Titelmasterformat durch Klicken bearbeiten</a:t>
             </a:r>
             <a:endParaRPr lang="en-US" dirty="0"/>
@@ -3197,7 +3152,7 @@
           </a:lstStyle>
           <a:p>
             <a:r>
-              <a:rPr lang="de-DE" smtClean="0"/>
+              <a:rPr lang="de-DE"/>
               <a:t>Bild durch Klicken auf Symbol hinzufügen</a:t>
             </a:r>
             <a:endParaRPr lang="en-US" dirty="0"/>
@@ -3263,7 +3218,7 @@
           <a:p>
             <a:pPr lvl="0"/>
             <a:r>
-              <a:rPr lang="de-DE" smtClean="0"/>
+              <a:rPr lang="de-DE"/>
               <a:t>Formatvorlagen des Textmasters bearbeiten</a:t>
             </a:r>
           </a:p>
@@ -3285,7 +3240,7 @@
           <a:lstStyle/>
           <a:p>
             <a:r>
-              <a:rPr lang="en-US" smtClean="0"/>
+              <a:rPr lang="en-US"/>
               <a:t>Ganiyu Ibraheem  Philipp Seybold</a:t>
             </a:r>
             <a:endParaRPr lang="en-GB"/>
@@ -3308,10 +3263,9 @@
           <a:lstStyle/>
           <a:p>
             <a:r>
-              <a:rPr lang="en-GB" smtClean="0"/>
+              <a:rPr lang="en-GB"/>
               <a:t>COMP6206 Advanced Computer Vision</a:t>
             </a:r>
-            <a:endParaRPr lang="en-GB"/>
           </a:p>
         </p:txBody>
       </p:sp>
@@ -3332,7 +3286,7 @@
           <a:p>
             <a:fld id="{FB9D3F8E-99BC-4812-95D4-548B8E992B94}" type="slidenum">
               <a:rPr lang="en-GB" smtClean="0"/>
-              <a:t>‹Nr.›</a:t>
+              <a:t>‹#›</a:t>
             </a:fld>
             <a:endParaRPr lang="en-GB"/>
           </a:p>
@@ -3399,7 +3353,7 @@
           <a:lstStyle/>
           <a:p>
             <a:r>
-              <a:rPr lang="de-DE" smtClean="0"/>
+              <a:rPr lang="de-DE"/>
               <a:t>Titelmasterformat durch Klicken bearbeiten</a:t>
             </a:r>
             <a:endParaRPr lang="en-US" dirty="0"/>
@@ -3433,35 +3387,35 @@
           <a:p>
             <a:pPr lvl="0"/>
             <a:r>
-              <a:rPr lang="de-DE" dirty="0" smtClean="0"/>
+              <a:rPr lang="de-DE" dirty="0"/>
               <a:t>Formatvorlagen des Textmasters bearbeiten</a:t>
             </a:r>
           </a:p>
           <a:p>
             <a:pPr lvl="1"/>
             <a:r>
-              <a:rPr lang="de-DE" dirty="0" smtClean="0"/>
+              <a:rPr lang="de-DE" dirty="0"/>
               <a:t>Zweite Ebene</a:t>
             </a:r>
           </a:p>
           <a:p>
             <a:pPr lvl="2"/>
             <a:r>
-              <a:rPr lang="de-DE" dirty="0" smtClean="0"/>
+              <a:rPr lang="de-DE" dirty="0"/>
               <a:t>Dritte Ebene</a:t>
             </a:r>
           </a:p>
           <a:p>
             <a:pPr lvl="3"/>
             <a:r>
-              <a:rPr lang="de-DE" dirty="0" smtClean="0"/>
+              <a:rPr lang="de-DE" dirty="0"/>
               <a:t>Vierte Ebene</a:t>
             </a:r>
           </a:p>
           <a:p>
             <a:pPr lvl="4"/>
             <a:r>
-              <a:rPr lang="de-DE" dirty="0" smtClean="0"/>
+              <a:rPr lang="de-DE" dirty="0"/>
               <a:t>Fünfte Ebene</a:t>
             </a:r>
             <a:endParaRPr lang="en-US" dirty="0"/>
@@ -3502,7 +3456,7 @@
           </a:lstStyle>
           <a:p>
             <a:r>
-              <a:rPr lang="en-US" dirty="0" smtClean="0"/>
+              <a:rPr lang="en-US" dirty="0"/>
               <a:t>Ganiyu Ibraheem  Philipp Seybold</a:t>
             </a:r>
             <a:endParaRPr lang="en-GB" dirty="0"/>
@@ -3543,10 +3497,9 @@
           </a:lstStyle>
           <a:p>
             <a:r>
-              <a:rPr lang="en-GB" dirty="0" smtClean="0"/>
+              <a:rPr lang="en-GB" dirty="0"/>
               <a:t>COMP6206 Advanced Computer Vision</a:t>
             </a:r>
-            <a:endParaRPr lang="en-GB" dirty="0"/>
           </a:p>
         </p:txBody>
       </p:sp>
@@ -3585,7 +3538,7 @@
           <a:p>
             <a:fld id="{FB9D3F8E-99BC-4812-95D4-548B8E992B94}" type="slidenum">
               <a:rPr lang="en-GB" smtClean="0"/>
-              <a:t>‹Nr.›</a:t>
+              <a:t>‹#›</a:t>
             </a:fld>
             <a:endParaRPr lang="en-GB"/>
           </a:p>
@@ -3650,13 +3603,6 @@
     <p:sldLayoutId id="2147483670" r:id="rId10"/>
     <p:sldLayoutId id="2147483671" r:id="rId11"/>
   </p:sldLayoutIdLst>
-  <p:timing>
-    <p:tnLst>
-      <p:par>
-        <p:cTn id="1" dur="indefinite" restart="never" nodeType="tmRoot"/>
-      </p:par>
-    </p:tnLst>
-  </p:timing>
   <p:hf hdr="0"/>
   <p:txStyles>
     <p:titleStyle>
@@ -3989,67 +3935,65 @@
           <a:lstStyle/>
           <a:p>
             <a:r>
-              <a:rPr lang="en-GB" dirty="0" smtClean="0"/>
+              <a:rPr lang="en-GB" dirty="0"/>
               <a:t>Force Field Transformation</a:t>
             </a:r>
+          </a:p>
+        </p:txBody>
+      </p:sp>
+      <p:sp>
+        <p:nvSpPr>
+          <p:cNvPr id="70" name="Untertitel 69"/>
+          <p:cNvSpPr>
+            <a:spLocks noGrp="1"/>
+          </p:cNvSpPr>
+          <p:nvPr>
+            <p:ph type="subTitle" idx="1"/>
+          </p:nvPr>
+        </p:nvSpPr>
+        <p:spPr/>
+        <p:txBody>
+          <a:bodyPr/>
+          <a:lstStyle/>
+          <a:p>
+            <a:r>
+              <a:rPr lang="en-GB" dirty="0"/>
+              <a:t>Ganiyu Ibraheem &amp; Philipp Seybold</a:t>
+            </a:r>
+          </a:p>
+          <a:p>
+            <a:r>
+              <a:rPr lang="en-GB" dirty="0"/>
+              <a:t>Advanced Computer Vision</a:t>
+            </a:r>
+          </a:p>
+        </p:txBody>
+      </p:sp>
+      <p:sp>
+        <p:nvSpPr>
+          <p:cNvPr id="8" name="Datumsplatzhalter 7"/>
+          <p:cNvSpPr>
+            <a:spLocks noGrp="1"/>
+          </p:cNvSpPr>
+          <p:nvPr>
+            <p:ph type="dt" sz="half" idx="10"/>
+          </p:nvPr>
+        </p:nvSpPr>
+        <p:spPr/>
+        <p:txBody>
+          <a:bodyPr/>
+          <a:lstStyle/>
+          <a:p>
+            <a:r>
+              <a:rPr lang="en-US" dirty="0"/>
+              <a:t>Ganiyu Ibraheem  Philipp Seybold</a:t>
+            </a:r>
             <a:endParaRPr lang="en-GB" dirty="0"/>
           </a:p>
         </p:txBody>
       </p:sp>
       <p:sp>
         <p:nvSpPr>
-          <p:cNvPr id="70" name="Untertitel 69"/>
-          <p:cNvSpPr>
-            <a:spLocks noGrp="1"/>
-          </p:cNvSpPr>
-          <p:nvPr>
-            <p:ph type="subTitle" idx="1"/>
-          </p:nvPr>
-        </p:nvSpPr>
-        <p:spPr/>
-        <p:txBody>
-          <a:bodyPr/>
-          <a:lstStyle/>
-          <a:p>
-            <a:r>
-              <a:rPr lang="en-GB" dirty="0" smtClean="0"/>
-              <a:t>Ganiyu Ibraheem &amp; Philipp Seybold</a:t>
-            </a:r>
-          </a:p>
-          <a:p>
-            <a:r>
-              <a:rPr lang="en-GB" dirty="0" smtClean="0"/>
-              <a:t>Advanced Computer Vision</a:t>
-            </a:r>
-            <a:endParaRPr lang="en-GB" dirty="0"/>
-          </a:p>
-        </p:txBody>
-      </p:sp>
-      <p:sp>
-        <p:nvSpPr>
-          <p:cNvPr id="8" name="Datumsplatzhalter 7"/>
-          <p:cNvSpPr>
-            <a:spLocks noGrp="1"/>
-          </p:cNvSpPr>
-          <p:nvPr>
-            <p:ph type="dt" sz="half" idx="10"/>
-          </p:nvPr>
-        </p:nvSpPr>
-        <p:spPr/>
-        <p:txBody>
-          <a:bodyPr/>
-          <a:lstStyle/>
-          <a:p>
-            <a:r>
-              <a:rPr lang="en-US" dirty="0" smtClean="0"/>
-              <a:t>Ganiyu Ibraheem  Philipp Seybold</a:t>
-            </a:r>
-            <a:endParaRPr lang="en-GB" dirty="0"/>
-          </a:p>
-        </p:txBody>
-      </p:sp>
-      <p:sp>
-        <p:nvSpPr>
           <p:cNvPr id="9" name="Fußzeilenplatzhalter 8"/>
           <p:cNvSpPr>
             <a:spLocks noGrp="1"/>
@@ -4064,7 +4008,7 @@
           <a:lstStyle/>
           <a:p>
             <a:r>
-              <a:rPr lang="en-GB" smtClean="0"/>
+              <a:rPr lang="en-GB"/>
               <a:t>COMP6206 Advanced Computer Vision</a:t>
             </a:r>
             <a:endParaRPr lang="en-GB" dirty="0"/>
@@ -4105,13 +4049,6 @@
   <p:clrMapOvr>
     <a:masterClrMapping/>
   </p:clrMapOvr>
-  <p:timing>
-    <p:tnLst>
-      <p:par>
-        <p:cTn id="1" dur="indefinite" restart="never" nodeType="tmRoot"/>
-      </p:par>
-    </p:tnLst>
-  </p:timing>
 </p:sld>
 </file>
 
@@ -4150,61 +4087,59 @@
           <a:lstStyle/>
           <a:p>
             <a:r>
-              <a:rPr lang="en-GB" dirty="0" smtClean="0"/>
+              <a:rPr lang="en-GB" dirty="0"/>
               <a:t>Result</a:t>
             </a:r>
+          </a:p>
+        </p:txBody>
+      </p:sp>
+      <p:sp>
+        <p:nvSpPr>
+          <p:cNvPr id="3" name="Inhaltsplatzhalter 2"/>
+          <p:cNvSpPr>
+            <a:spLocks noGrp="1"/>
+          </p:cNvSpPr>
+          <p:nvPr>
+            <p:ph idx="1"/>
+          </p:nvPr>
+        </p:nvSpPr>
+        <p:spPr/>
+        <p:txBody>
+          <a:bodyPr/>
+          <a:lstStyle/>
+          <a:p>
+            <a:r>
+              <a:rPr lang="en-GB" dirty="0"/>
+              <a:t>Other application areas?</a:t>
+            </a:r>
+          </a:p>
+        </p:txBody>
+      </p:sp>
+      <p:sp>
+        <p:nvSpPr>
+          <p:cNvPr id="4" name="Datumsplatzhalter 3"/>
+          <p:cNvSpPr>
+            <a:spLocks noGrp="1"/>
+          </p:cNvSpPr>
+          <p:nvPr>
+            <p:ph type="dt" sz="half" idx="10"/>
+          </p:nvPr>
+        </p:nvSpPr>
+        <p:spPr/>
+        <p:txBody>
+          <a:bodyPr/>
+          <a:lstStyle/>
+          <a:p>
+            <a:r>
+              <a:rPr lang="en-US"/>
+              <a:t>Ganiyu Ibraheem  Philipp Seybold</a:t>
+            </a:r>
             <a:endParaRPr lang="en-GB" dirty="0"/>
           </a:p>
         </p:txBody>
       </p:sp>
       <p:sp>
         <p:nvSpPr>
-          <p:cNvPr id="3" name="Inhaltsplatzhalter 2"/>
-          <p:cNvSpPr>
-            <a:spLocks noGrp="1"/>
-          </p:cNvSpPr>
-          <p:nvPr>
-            <p:ph idx="1"/>
-          </p:nvPr>
-        </p:nvSpPr>
-        <p:spPr/>
-        <p:txBody>
-          <a:bodyPr/>
-          <a:lstStyle/>
-          <a:p>
-            <a:r>
-              <a:rPr lang="en-GB" dirty="0" smtClean="0"/>
-              <a:t>Other application areas?</a:t>
-            </a:r>
-            <a:endParaRPr lang="en-GB" dirty="0"/>
-          </a:p>
-        </p:txBody>
-      </p:sp>
-      <p:sp>
-        <p:nvSpPr>
-          <p:cNvPr id="4" name="Datumsplatzhalter 3"/>
-          <p:cNvSpPr>
-            <a:spLocks noGrp="1"/>
-          </p:cNvSpPr>
-          <p:nvPr>
-            <p:ph type="dt" sz="half" idx="10"/>
-          </p:nvPr>
-        </p:nvSpPr>
-        <p:spPr/>
-        <p:txBody>
-          <a:bodyPr/>
-          <a:lstStyle/>
-          <a:p>
-            <a:r>
-              <a:rPr lang="en-US" smtClean="0"/>
-              <a:t>Ganiyu Ibraheem  Philipp Seybold</a:t>
-            </a:r>
-            <a:endParaRPr lang="en-GB" dirty="0"/>
-          </a:p>
-        </p:txBody>
-      </p:sp>
-      <p:sp>
-        <p:nvSpPr>
           <p:cNvPr id="5" name="Fußzeilenplatzhalter 4"/>
           <p:cNvSpPr>
             <a:spLocks noGrp="1"/>
@@ -4219,10 +4154,9 @@
           <a:lstStyle/>
           <a:p>
             <a:r>
-              <a:rPr lang="en-GB" smtClean="0"/>
+              <a:rPr lang="en-GB"/>
               <a:t>COMP6206 Advanced Computer Vision</a:t>
             </a:r>
-            <a:endParaRPr lang="en-GB"/>
           </a:p>
         </p:txBody>
       </p:sp>
@@ -4259,13 +4193,6 @@
   <p:clrMapOvr>
     <a:masterClrMapping/>
   </p:clrMapOvr>
-  <p:timing>
-    <p:tnLst>
-      <p:par>
-        <p:cTn id="1" dur="indefinite" restart="never" nodeType="tmRoot"/>
-      </p:par>
-    </p:tnLst>
-  </p:timing>
 </p:sld>
 </file>
 
@@ -4304,10 +4231,9 @@
           <a:lstStyle/>
           <a:p>
             <a:r>
-              <a:rPr lang="en-GB" dirty="0" smtClean="0"/>
+              <a:rPr lang="en-GB" dirty="0"/>
               <a:t>Discussion</a:t>
             </a:r>
-            <a:endParaRPr lang="en-GB" dirty="0"/>
           </a:p>
         </p:txBody>
       </p:sp>
@@ -4327,7 +4253,7 @@
           <a:lstStyle/>
           <a:p>
             <a:r>
-              <a:rPr lang="en-GB" dirty="0" smtClean="0"/>
+              <a:rPr lang="en-GB" dirty="0"/>
               <a:t>Any Questions?</a:t>
             </a:r>
           </a:p>
@@ -4358,7 +4284,7 @@
           <a:lstStyle/>
           <a:p>
             <a:r>
-              <a:rPr lang="en-US" smtClean="0"/>
+              <a:rPr lang="en-US"/>
               <a:t>Ganiyu Ibraheem  Philipp Seybold</a:t>
             </a:r>
             <a:endParaRPr lang="en-GB" dirty="0"/>
@@ -4381,10 +4307,9 @@
           <a:lstStyle/>
           <a:p>
             <a:r>
-              <a:rPr lang="en-GB" smtClean="0"/>
+              <a:rPr lang="en-GB"/>
               <a:t>COMP6206 Advanced Computer Vision</a:t>
             </a:r>
-            <a:endParaRPr lang="en-GB"/>
           </a:p>
         </p:txBody>
       </p:sp>
@@ -4462,13 +4387,6 @@
   <p:clrMapOvr>
     <a:masterClrMapping/>
   </p:clrMapOvr>
-  <p:timing>
-    <p:tnLst>
-      <p:par>
-        <p:cTn id="1" dur="indefinite" restart="never" nodeType="tmRoot"/>
-      </p:par>
-    </p:tnLst>
-  </p:timing>
 </p:sld>
 </file>
 
@@ -4507,83 +4425,81 @@
           <a:lstStyle/>
           <a:p>
             <a:r>
-              <a:rPr lang="en-GB" dirty="0" smtClean="0"/>
+              <a:rPr lang="en-GB" dirty="0"/>
               <a:t>Sources</a:t>
             </a:r>
+          </a:p>
+        </p:txBody>
+      </p:sp>
+      <p:sp>
+        <p:nvSpPr>
+          <p:cNvPr id="3" name="Inhaltsplatzhalter 2"/>
+          <p:cNvSpPr>
+            <a:spLocks noGrp="1"/>
+          </p:cNvSpPr>
+          <p:nvPr>
+            <p:ph idx="1"/>
+          </p:nvPr>
+        </p:nvSpPr>
+        <p:spPr/>
+        <p:txBody>
+          <a:bodyPr/>
+          <a:lstStyle/>
+          <a:p>
+            <a:r>
+              <a:rPr lang="en-GB" dirty="0"/>
+              <a:t>3 Papers</a:t>
+            </a:r>
+          </a:p>
+          <a:p>
+            <a:r>
+              <a:rPr lang="en-GB" dirty="0"/>
+              <a:t>Marks book</a:t>
+            </a:r>
+          </a:p>
+          <a:p>
+            <a:r>
+              <a:rPr lang="en-GB" dirty="0" err="1"/>
+              <a:t>Linkedin</a:t>
+            </a:r>
+            <a:r>
+              <a:rPr lang="en-GB" dirty="0"/>
+              <a:t> slides</a:t>
+            </a:r>
+          </a:p>
+          <a:p>
+            <a:r>
+              <a:rPr lang="en-GB" dirty="0"/>
+              <a:t>Git repo from that guy (maybe)</a:t>
+            </a:r>
+          </a:p>
+        </p:txBody>
+      </p:sp>
+      <p:sp>
+        <p:nvSpPr>
+          <p:cNvPr id="4" name="Datumsplatzhalter 3"/>
+          <p:cNvSpPr>
+            <a:spLocks noGrp="1"/>
+          </p:cNvSpPr>
+          <p:nvPr>
+            <p:ph type="dt" sz="half" idx="10"/>
+          </p:nvPr>
+        </p:nvSpPr>
+        <p:spPr/>
+        <p:txBody>
+          <a:bodyPr/>
+          <a:lstStyle/>
+          <a:p>
+            <a:r>
+              <a:rPr lang="en-US"/>
+              <a:t>Ganiyu Ibraheem  Philipp Seybold</a:t>
+            </a:r>
             <a:endParaRPr lang="en-GB" dirty="0"/>
           </a:p>
         </p:txBody>
       </p:sp>
       <p:sp>
         <p:nvSpPr>
-          <p:cNvPr id="3" name="Inhaltsplatzhalter 2"/>
-          <p:cNvSpPr>
-            <a:spLocks noGrp="1"/>
-          </p:cNvSpPr>
-          <p:nvPr>
-            <p:ph idx="1"/>
-          </p:nvPr>
-        </p:nvSpPr>
-        <p:spPr/>
-        <p:txBody>
-          <a:bodyPr/>
-          <a:lstStyle/>
-          <a:p>
-            <a:r>
-              <a:rPr lang="en-GB" dirty="0" smtClean="0"/>
-              <a:t>3 Papers</a:t>
-            </a:r>
-          </a:p>
-          <a:p>
-            <a:r>
-              <a:rPr lang="en-GB" dirty="0" smtClean="0"/>
-              <a:t>Marks book</a:t>
-            </a:r>
-          </a:p>
-          <a:p>
-            <a:r>
-              <a:rPr lang="en-GB" dirty="0" err="1" smtClean="0"/>
-              <a:t>Linkedin</a:t>
-            </a:r>
-            <a:r>
-              <a:rPr lang="en-GB" dirty="0" smtClean="0"/>
-              <a:t> slides</a:t>
-            </a:r>
-          </a:p>
-          <a:p>
-            <a:r>
-              <a:rPr lang="en-GB" dirty="0" smtClean="0"/>
-              <a:t>Git repo from that guy (maybe)</a:t>
-            </a:r>
-            <a:endParaRPr lang="en-GB" dirty="0"/>
-          </a:p>
-        </p:txBody>
-      </p:sp>
-      <p:sp>
-        <p:nvSpPr>
-          <p:cNvPr id="4" name="Datumsplatzhalter 3"/>
-          <p:cNvSpPr>
-            <a:spLocks noGrp="1"/>
-          </p:cNvSpPr>
-          <p:nvPr>
-            <p:ph type="dt" sz="half" idx="10"/>
-          </p:nvPr>
-        </p:nvSpPr>
-        <p:spPr/>
-        <p:txBody>
-          <a:bodyPr/>
-          <a:lstStyle/>
-          <a:p>
-            <a:r>
-              <a:rPr lang="en-US" smtClean="0"/>
-              <a:t>Ganiyu Ibraheem  Philipp Seybold</a:t>
-            </a:r>
-            <a:endParaRPr lang="en-GB" dirty="0"/>
-          </a:p>
-        </p:txBody>
-      </p:sp>
-      <p:sp>
-        <p:nvSpPr>
           <p:cNvPr id="5" name="Fußzeilenplatzhalter 4"/>
           <p:cNvSpPr>
             <a:spLocks noGrp="1"/>
@@ -4598,10 +4514,9 @@
           <a:lstStyle/>
           <a:p>
             <a:r>
-              <a:rPr lang="en-GB" smtClean="0"/>
+              <a:rPr lang="en-GB"/>
               <a:t>COMP6206 Advanced Computer Vision</a:t>
             </a:r>
-            <a:endParaRPr lang="en-GB"/>
           </a:p>
         </p:txBody>
       </p:sp>
@@ -4638,13 +4553,6 @@
   <p:clrMapOvr>
     <a:masterClrMapping/>
   </p:clrMapOvr>
-  <p:timing>
-    <p:tnLst>
-      <p:par>
-        <p:cTn id="1" dur="indefinite" restart="never" nodeType="tmRoot"/>
-      </p:par>
-    </p:tnLst>
-  </p:timing>
 </p:sld>
 </file>
 
@@ -4703,7 +4611,7 @@
           <a:lstStyle/>
           <a:p>
             <a:r>
-              <a:rPr lang="en-US" smtClean="0"/>
+              <a:rPr lang="en-US"/>
               <a:t>Ganiyu Ibraheem  Philipp Seybold</a:t>
             </a:r>
             <a:endParaRPr lang="en-GB"/>
@@ -4726,10 +4634,9 @@
           <a:lstStyle/>
           <a:p>
             <a:r>
-              <a:rPr lang="en-GB" smtClean="0"/>
+              <a:rPr lang="en-GB"/>
               <a:t>COMP6206 Advanced Computer Vision</a:t>
             </a:r>
-            <a:endParaRPr lang="en-GB"/>
           </a:p>
         </p:txBody>
       </p:sp>
@@ -4956,36 +4863,36 @@
           </a:lstStyle>
           <a:p>
             <a:r>
-              <a:rPr lang="en-GB" smtClean="0"/>
+              <a:rPr lang="en-GB"/>
               <a:t>Definition</a:t>
             </a:r>
           </a:p>
           <a:p>
             <a:r>
-              <a:rPr lang="en-GB" smtClean="0"/>
+              <a:rPr lang="en-GB"/>
               <a:t>Method Application</a:t>
             </a:r>
           </a:p>
           <a:p>
             <a:r>
-              <a:rPr lang="en-GB" smtClean="0"/>
+              <a:rPr lang="en-GB"/>
               <a:t>Demonstration</a:t>
             </a:r>
           </a:p>
           <a:p>
             <a:r>
-              <a:rPr lang="en-GB" smtClean="0"/>
+              <a:rPr lang="en-GB"/>
               <a:t>Result</a:t>
             </a:r>
           </a:p>
           <a:p>
             <a:r>
-              <a:rPr lang="en-GB" smtClean="0"/>
+              <a:rPr lang="en-GB"/>
               <a:t>Discussion</a:t>
             </a:r>
           </a:p>
           <a:p>
-            <a:endParaRPr lang="en-GB" smtClean="0"/>
+            <a:endParaRPr lang="en-GB"/>
           </a:p>
           <a:p>
             <a:endParaRPr lang="en-GB" dirty="0"/>
@@ -5002,13 +4909,6 @@
   <p:clrMapOvr>
     <a:masterClrMapping/>
   </p:clrMapOvr>
-  <p:timing>
-    <p:tnLst>
-      <p:par>
-        <p:cTn id="1" dur="indefinite" restart="never" nodeType="tmRoot"/>
-      </p:par>
-    </p:tnLst>
-  </p:timing>
 </p:sld>
 </file>
 
@@ -5047,135 +4947,92 @@
           <a:lstStyle/>
           <a:p>
             <a:r>
-              <a:rPr lang="en-GB" dirty="0" smtClean="0"/>
+              <a:rPr lang="en-GB" dirty="0"/>
               <a:t>Definition</a:t>
             </a:r>
+          </a:p>
+        </p:txBody>
+      </p:sp>
+      <p:sp>
+        <p:nvSpPr>
+          <p:cNvPr id="3" name="Inhaltsplatzhalter 2"/>
+          <p:cNvSpPr>
+            <a:spLocks noGrp="1"/>
+          </p:cNvSpPr>
+          <p:nvPr>
+            <p:ph idx="1"/>
+          </p:nvPr>
+        </p:nvSpPr>
+        <p:spPr/>
+        <p:txBody>
+          <a:bodyPr/>
+          <a:lstStyle/>
+          <a:p>
+            <a:pPr lvl="0"/>
+            <a:r>
+              <a:rPr lang="en-GB" dirty="0"/>
+              <a:t>Objective:</a:t>
+            </a:r>
+          </a:p>
+          <a:p>
+            <a:pPr lvl="1"/>
+            <a:r>
+              <a:rPr lang="en-GB" dirty="0"/>
+              <a:t>Reduce dimensionality of pattern space</a:t>
+            </a:r>
+          </a:p>
+          <a:p>
+            <a:pPr lvl="1"/>
+            <a:r>
+              <a:rPr lang="en-GB" dirty="0"/>
+              <a:t>Maintain discriminator power</a:t>
+            </a:r>
+          </a:p>
+          <a:p>
+            <a:r>
+              <a:rPr lang="en-GB" dirty="0"/>
+              <a:t>By: 	David J. Hurley, </a:t>
+            </a:r>
+            <a:br>
+              <a:rPr lang="en-GB" dirty="0"/>
+            </a:br>
+            <a:r>
+              <a:rPr lang="en-GB" dirty="0"/>
+              <a:t>	Mark S. Nixon &amp; John N. Carter</a:t>
+            </a:r>
+          </a:p>
+          <a:p>
+            <a:r>
+              <a:rPr lang="en-GB" dirty="0"/>
+              <a:t>Domain: Ear &amp; face recognition</a:t>
+            </a:r>
+          </a:p>
+          <a:p>
             <a:endParaRPr lang="en-GB" dirty="0"/>
           </a:p>
         </p:txBody>
       </p:sp>
       <p:sp>
         <p:nvSpPr>
-          <p:cNvPr id="3" name="Inhaltsplatzhalter 2"/>
-          <p:cNvSpPr>
-            <a:spLocks noGrp="1"/>
-          </p:cNvSpPr>
-          <p:nvPr>
-            <p:ph idx="1"/>
-          </p:nvPr>
-        </p:nvSpPr>
-        <p:spPr/>
-        <p:txBody>
-          <a:bodyPr/>
-          <a:lstStyle/>
-          <a:p>
-            <a:pPr lvl="0"/>
-            <a:r>
-              <a:rPr lang="en-GB" dirty="0" smtClean="0"/>
-              <a:t>Objective:</a:t>
-            </a:r>
-          </a:p>
-          <a:p>
-            <a:pPr lvl="1"/>
-            <a:r>
-              <a:rPr lang="en-GB" dirty="0" smtClean="0"/>
-              <a:t>Reduce </a:t>
-            </a:r>
-            <a:r>
-              <a:rPr lang="en-GB" dirty="0"/>
-              <a:t>dimensionality of pattern </a:t>
-            </a:r>
-            <a:r>
-              <a:rPr lang="en-GB" dirty="0" smtClean="0"/>
-              <a:t>space</a:t>
-            </a:r>
-          </a:p>
-          <a:p>
-            <a:pPr lvl="1"/>
-            <a:r>
-              <a:rPr lang="en-GB" dirty="0" smtClean="0"/>
-              <a:t>Maintain </a:t>
-            </a:r>
-            <a:r>
-              <a:rPr lang="en-GB" dirty="0"/>
-              <a:t>discriminator </a:t>
-            </a:r>
-            <a:r>
-              <a:rPr lang="en-GB" dirty="0" smtClean="0"/>
-              <a:t>power</a:t>
+          <p:cNvPr id="4" name="Datumsplatzhalter 3"/>
+          <p:cNvSpPr>
+            <a:spLocks noGrp="1"/>
+          </p:cNvSpPr>
+          <p:nvPr>
+            <p:ph type="dt" sz="half" idx="10"/>
+          </p:nvPr>
+        </p:nvSpPr>
+        <p:spPr/>
+        <p:txBody>
+          <a:bodyPr/>
+          <a:lstStyle/>
+          <a:p>
+            <a:r>
+              <a:rPr lang="en-US"/>
+              <a:t>Ganiyu Ibraheem  Philipp Seybold</a:t>
             </a:r>
             <a:endParaRPr lang="en-GB" dirty="0"/>
           </a:p>
-          <a:p>
-            <a:r>
-              <a:rPr lang="en-GB" dirty="0" smtClean="0"/>
-              <a:t>By: 	David </a:t>
-            </a:r>
-            <a:r>
-              <a:rPr lang="en-GB" dirty="0"/>
-              <a:t>J. Hurley, </a:t>
-            </a:r>
-            <a:r>
-              <a:rPr lang="en-GB" dirty="0" smtClean="0"/>
-              <a:t/>
-            </a:r>
-            <a:br>
-              <a:rPr lang="en-GB" dirty="0" smtClean="0"/>
-            </a:br>
-            <a:r>
-              <a:rPr lang="en-GB" dirty="0" smtClean="0"/>
-              <a:t>	Mark </a:t>
-            </a:r>
-            <a:r>
-              <a:rPr lang="en-GB" dirty="0"/>
-              <a:t>S. </a:t>
-            </a:r>
-            <a:r>
-              <a:rPr lang="en-GB" dirty="0" smtClean="0"/>
-              <a:t>Nixon &amp; </a:t>
-            </a:r>
-            <a:r>
-              <a:rPr lang="en-GB" dirty="0"/>
-              <a:t>John N. Carter</a:t>
-            </a:r>
-          </a:p>
-          <a:p>
-            <a:r>
-              <a:rPr lang="en-GB" dirty="0" smtClean="0"/>
-              <a:t>Domain:</a:t>
-            </a:r>
-            <a:r>
-              <a:rPr lang="en-GB" dirty="0" smtClean="0"/>
-              <a:t> Ear &amp; face recognition</a:t>
-            </a:r>
-            <a:endParaRPr lang="en-GB" dirty="0"/>
-          </a:p>
-          <a:p>
-            <a:endParaRPr lang="en-GB" dirty="0"/>
-          </a:p>
-        </p:txBody>
-      </p:sp>
-      <p:sp>
-        <p:nvSpPr>
-          <p:cNvPr id="4" name="Datumsplatzhalter 3"/>
-          <p:cNvSpPr>
-            <a:spLocks noGrp="1"/>
-          </p:cNvSpPr>
-          <p:nvPr>
-            <p:ph type="dt" sz="half" idx="10"/>
-          </p:nvPr>
-        </p:nvSpPr>
-        <p:spPr/>
-        <p:txBody>
-          <a:bodyPr/>
-          <a:lstStyle/>
-          <a:p>
-            <a:r>
-              <a:rPr lang="en-US" smtClean="0"/>
-              <a:t>Ganiyu Ibraheem  Philipp Seybold</a:t>
-            </a:r>
-            <a:endParaRPr lang="en-GB" dirty="0"/>
-          </a:p>
         </p:txBody>
       </p:sp>
       <p:sp>
@@ -5194,10 +5051,9 @@
           <a:lstStyle/>
           <a:p>
             <a:r>
-              <a:rPr lang="en-GB" smtClean="0"/>
+              <a:rPr lang="en-GB"/>
               <a:t>COMP6206 Advanced Computer Vision</a:t>
             </a:r>
-            <a:endParaRPr lang="en-GB"/>
           </a:p>
         </p:txBody>
       </p:sp>
@@ -5234,13 +5090,6 @@
   <p:clrMapOvr>
     <a:masterClrMapping/>
   </p:clrMapOvr>
-  <p:timing>
-    <p:tnLst>
-      <p:par>
-        <p:cTn id="1" dur="indefinite" restart="never" nodeType="tmRoot"/>
-      </p:par>
-    </p:tnLst>
-  </p:timing>
 </p:sld>
 </file>
 
@@ -5282,7 +5131,6 @@
               <a:rPr lang="en-GB" dirty="0"/>
               <a:t>Method</a:t>
             </a:r>
-            <a:endParaRPr lang="en-GB" dirty="0"/>
           </a:p>
         </p:txBody>
       </p:sp>
@@ -5315,7 +5163,7 @@
               <a:buAutoNum type="arabicPeriod"/>
             </a:pPr>
             <a:r>
-              <a:rPr lang="en-GB" dirty="0" smtClean="0"/>
+              <a:rPr lang="en-GB" dirty="0"/>
               <a:t>Pixel by Pixel</a:t>
             </a:r>
           </a:p>
@@ -5325,24 +5173,15 @@
               <a:buAutoNum type="arabicPeriod"/>
             </a:pPr>
             <a:r>
-              <a:rPr lang="en-GB" dirty="0" smtClean="0"/>
-              <a:t>Frequency </a:t>
-            </a:r>
-            <a:r>
               <a:rPr lang="en-GB" dirty="0"/>
-              <a:t>Domain </a:t>
-            </a:r>
-            <a:r>
-              <a:rPr lang="en-GB" dirty="0" smtClean="0"/>
-              <a:t>Analysis</a:t>
-            </a:r>
-          </a:p>
-          <a:p>
-            <a:r>
-              <a:rPr lang="en-GB" dirty="0" smtClean="0"/>
+              <a:t>Frequency Domain Analysis</a:t>
+            </a:r>
+          </a:p>
+          <a:p>
+            <a:r>
+              <a:rPr lang="en-GB" dirty="0"/>
               <a:t>Steps:</a:t>
             </a:r>
-            <a:endParaRPr lang="en-GB" dirty="0"/>
           </a:p>
           <a:p>
             <a:pPr marL="914400" lvl="1" indent="-457200">
@@ -5360,16 +5199,30 @@
               <a:buAutoNum type="arabicPeriod"/>
             </a:pPr>
             <a:r>
-              <a:rPr lang="en-GB" dirty="0" smtClean="0"/>
-              <a:t>potential </a:t>
-            </a:r>
-            <a:r>
               <a:rPr lang="en-GB" dirty="0"/>
-              <a:t>well and channel </a:t>
-            </a:r>
-            <a:r>
-              <a:rPr lang="en-GB" dirty="0" smtClean="0"/>
-              <a:t>extraction</a:t>
+              <a:t>potential well and channel extraction</a:t>
+            </a:r>
+          </a:p>
+        </p:txBody>
+      </p:sp>
+      <p:sp>
+        <p:nvSpPr>
+          <p:cNvPr id="4" name="Datumsplatzhalter 3"/>
+          <p:cNvSpPr>
+            <a:spLocks noGrp="1"/>
+          </p:cNvSpPr>
+          <p:nvPr>
+            <p:ph type="dt" sz="half" idx="10"/>
+          </p:nvPr>
+        </p:nvSpPr>
+        <p:spPr/>
+        <p:txBody>
+          <a:bodyPr/>
+          <a:lstStyle/>
+          <a:p>
+            <a:r>
+              <a:rPr lang="en-US"/>
+              <a:t>Ganiyu Ibraheem  Philipp Seybold</a:t>
             </a:r>
             <a:endParaRPr lang="en-GB" dirty="0"/>
           </a:p>
@@ -5377,29 +5230,6 @@
       </p:sp>
       <p:sp>
         <p:nvSpPr>
-          <p:cNvPr id="4" name="Datumsplatzhalter 3"/>
-          <p:cNvSpPr>
-            <a:spLocks noGrp="1"/>
-          </p:cNvSpPr>
-          <p:nvPr>
-            <p:ph type="dt" sz="half" idx="10"/>
-          </p:nvPr>
-        </p:nvSpPr>
-        <p:spPr/>
-        <p:txBody>
-          <a:bodyPr/>
-          <a:lstStyle/>
-          <a:p>
-            <a:r>
-              <a:rPr lang="en-US" smtClean="0"/>
-              <a:t>Ganiyu Ibraheem  Philipp Seybold</a:t>
-            </a:r>
-            <a:endParaRPr lang="en-GB" dirty="0"/>
-          </a:p>
-        </p:txBody>
-      </p:sp>
-      <p:sp>
-        <p:nvSpPr>
           <p:cNvPr id="5" name="Fußzeilenplatzhalter 4"/>
           <p:cNvSpPr>
             <a:spLocks noGrp="1"/>
@@ -5414,10 +5244,9 @@
           <a:lstStyle/>
           <a:p>
             <a:r>
-              <a:rPr lang="en-GB" smtClean="0"/>
+              <a:rPr lang="en-GB"/>
               <a:t>COMP6206 Advanced Computer Vision</a:t>
             </a:r>
-            <a:endParaRPr lang="en-GB"/>
           </a:p>
         </p:txBody>
       </p:sp>
@@ -5454,13 +5283,6 @@
   <p:clrMapOvr>
     <a:masterClrMapping/>
   </p:clrMapOvr>
-  <p:timing>
-    <p:tnLst>
-      <p:par>
-        <p:cTn id="1" dur="indefinite" restart="never" nodeType="tmRoot"/>
-      </p:par>
-    </p:tnLst>
-  </p:timing>
 </p:sld>
 </file>
 
@@ -5502,7 +5324,6 @@
               <a:rPr lang="en-GB" dirty="0"/>
               <a:t>Method</a:t>
             </a:r>
-            <a:endParaRPr lang="en-GB" dirty="0"/>
           </a:p>
         </p:txBody>
       </p:sp>
@@ -5530,82 +5351,61 @@
           <a:p>
             <a:pPr lvl="0"/>
             <a:r>
-              <a:rPr lang="en-GB" dirty="0" smtClean="0"/>
-              <a:t>A</a:t>
-            </a:r>
-            <a:r>
-              <a:rPr lang="en-GB" dirty="0" smtClean="0"/>
-              <a:t>ssumption: </a:t>
+              <a:rPr lang="en-GB" dirty="0"/>
+              <a:t>Assumption: </a:t>
             </a:r>
             <a:br>
-              <a:rPr lang="en-GB" dirty="0" smtClean="0"/>
+              <a:rPr lang="en-GB" dirty="0"/>
             </a:br>
             <a:r>
-              <a:rPr lang="en-GB" dirty="0" smtClean="0"/>
-              <a:t>Each </a:t>
-            </a:r>
-            <a:r>
               <a:rPr lang="en-GB" dirty="0"/>
-              <a:t>pixel exerts an isotropic force </a:t>
-            </a:r>
-            <a:r>
-              <a:rPr lang="en-GB" dirty="0" smtClean="0"/>
-              <a:t>proportional </a:t>
-            </a:r>
+              <a:t>Each pixel exerts an isotropic force proportional to its intensity</a:t>
+            </a:r>
+          </a:p>
+        </p:txBody>
+      </p:sp>
+      <p:sp>
+        <p:nvSpPr>
+          <p:cNvPr id="4" name="Datumsplatzhalter 3"/>
+          <p:cNvSpPr>
+            <a:spLocks noGrp="1"/>
+          </p:cNvSpPr>
+          <p:nvPr>
+            <p:ph type="dt" sz="half" idx="10"/>
+          </p:nvPr>
+        </p:nvSpPr>
+        <p:spPr/>
+        <p:txBody>
+          <a:bodyPr/>
+          <a:lstStyle/>
+          <a:p>
+            <a:r>
+              <a:rPr lang="en-US"/>
+              <a:t>Ganiyu Ibraheem  Philipp Seybold</a:t>
+            </a:r>
+            <a:endParaRPr lang="en-GB" dirty="0"/>
+          </a:p>
+        </p:txBody>
+      </p:sp>
+      <p:sp>
+        <p:nvSpPr>
+          <p:cNvPr id="5" name="Fußzeilenplatzhalter 4"/>
+          <p:cNvSpPr>
+            <a:spLocks noGrp="1"/>
+          </p:cNvSpPr>
+          <p:nvPr>
+            <p:ph type="ftr" sz="quarter" idx="11"/>
+          </p:nvPr>
+        </p:nvSpPr>
+        <p:spPr/>
+        <p:txBody>
+          <a:bodyPr/>
+          <a:lstStyle/>
+          <a:p>
             <a:r>
               <a:rPr lang="en-GB" dirty="0"/>
-              <a:t>to </a:t>
-            </a:r>
-            <a:r>
-              <a:rPr lang="en-GB" dirty="0" smtClean="0"/>
-              <a:t>its intensity</a:t>
-            </a:r>
-          </a:p>
-        </p:txBody>
-      </p:sp>
-      <p:sp>
-        <p:nvSpPr>
-          <p:cNvPr id="4" name="Datumsplatzhalter 3"/>
-          <p:cNvSpPr>
-            <a:spLocks noGrp="1"/>
-          </p:cNvSpPr>
-          <p:nvPr>
-            <p:ph type="dt" sz="half" idx="10"/>
-          </p:nvPr>
-        </p:nvSpPr>
-        <p:spPr/>
-        <p:txBody>
-          <a:bodyPr/>
-          <a:lstStyle/>
-          <a:p>
-            <a:r>
-              <a:rPr lang="en-US" smtClean="0"/>
-              <a:t>Ganiyu Ibraheem  Philipp Seybold</a:t>
-            </a:r>
-            <a:endParaRPr lang="en-GB" dirty="0"/>
-          </a:p>
-        </p:txBody>
-      </p:sp>
-      <p:sp>
-        <p:nvSpPr>
-          <p:cNvPr id="5" name="Fußzeilenplatzhalter 4"/>
-          <p:cNvSpPr>
-            <a:spLocks noGrp="1"/>
-          </p:cNvSpPr>
-          <p:nvPr>
-            <p:ph type="ftr" sz="quarter" idx="11"/>
-          </p:nvPr>
-        </p:nvSpPr>
-        <p:spPr/>
-        <p:txBody>
-          <a:bodyPr/>
-          <a:lstStyle/>
-          <a:p>
-            <a:r>
-              <a:rPr lang="en-GB" dirty="0" smtClean="0"/>
               <a:t>COMP6206 Advanced Computer Vision</a:t>
             </a:r>
-            <a:endParaRPr lang="en-GB" dirty="0"/>
           </a:p>
         </p:txBody>
       </p:sp>
@@ -5701,21 +5501,8 @@
               <a:pPr lvl="0" algn="ctr"/>
               <a:r>
                 <a:rPr lang="en-GB" sz="2000" dirty="0"/>
-                <a:t>Force field vectors </a:t>
+                <a:t>Force field vectors of an electric field</a:t>
               </a:r>
-              <a:r>
-                <a:rPr lang="en-GB" sz="2000" dirty="0" smtClean="0"/>
-                <a:t>of </a:t>
-              </a:r>
-              <a:r>
-                <a:rPr lang="en-GB" sz="2000" dirty="0"/>
-                <a:t>an electric </a:t>
-              </a:r>
-              <a:r>
-                <a:rPr lang="en-GB" sz="2000" dirty="0" smtClean="0"/>
-                <a:t>field</a:t>
-              </a:r>
-              <a:endParaRPr lang="en-GB" sz="2000" dirty="0"/>
             </a:p>
           </p:txBody>
         </p:sp>
@@ -5773,18 +5560,13 @@
             <a:pPr algn="ctr"/>
             <a:r>
               <a:rPr lang="en-GB" sz="2000" dirty="0"/>
-              <a:t>Newton's law of </a:t>
-            </a:r>
-            <a:r>
-              <a:rPr lang="en-GB" sz="2000" dirty="0" smtClean="0"/>
-              <a:t>gravitation</a:t>
-            </a:r>
-            <a:endParaRPr lang="en-GB" sz="2000" dirty="0"/>
-          </a:p>
-        </p:txBody>
-      </p:sp>
-      <mc:AlternateContent xmlns:mc="http://schemas.openxmlformats.org/markup-compatibility/2006">
-        <mc:Choice xmlns:a14="http://schemas.microsoft.com/office/drawing/2010/main" Requires="a14">
+              <a:t>Newton's law of gravitation</a:t>
+            </a:r>
+          </a:p>
+        </p:txBody>
+      </p:sp>
+      <mc:AlternateContent xmlns:mc="http://schemas.openxmlformats.org/markup-compatibility/2006" xmlns:a14="http://schemas.microsoft.com/office/drawing/2010/main">
+        <mc:Choice Requires="a14">
           <p:sp>
             <p:nvSpPr>
               <p:cNvPr id="12" name="Textfeld 11"/>
@@ -5979,7 +5761,7 @@
                     </m:oMath>
                   </m:oMathPara>
                 </a14:m>
-                <a:endParaRPr lang="en-GB" sz="2000" b="0" i="1" dirty="0" smtClean="0">
+                <a:endParaRPr lang="en-GB" sz="2000" b="0" i="1" dirty="0">
                   <a:latin typeface="Cambria Math" panose="02040503050406030204" pitchFamily="18" charset="0"/>
                 </a:endParaRPr>
               </a:p>
@@ -5989,15 +5771,9 @@
                   <a:rPr lang="en-GB" sz="900" i="1" dirty="0">
                     <a:latin typeface="Cambria Math" panose="02040503050406030204" pitchFamily="18" charset="0"/>
                   </a:rPr>
-                  <a:t> </a:t>
+                  <a:t>  </a:t>
                 </a:r>
-                <a:r>
-                  <a:rPr lang="en-GB" sz="900" i="1" dirty="0" smtClean="0">
-                    <a:latin typeface="Cambria Math" panose="02040503050406030204" pitchFamily="18" charset="0"/>
-                  </a:rPr>
-                  <a:t> </a:t>
-                </a:r>
-                <a:endParaRPr lang="en-GB" sz="800" b="0" i="1" dirty="0" smtClean="0">
+                <a:endParaRPr lang="en-GB" sz="800" b="0" i="1" dirty="0">
                   <a:latin typeface="Cambria Math" panose="02040503050406030204" pitchFamily="18" charset="0"/>
                 </a:endParaRPr>
               </a:p>
@@ -6110,7 +5886,7 @@
             </p:txBody>
           </p:sp>
         </mc:Choice>
-        <mc:Fallback>
+        <mc:Fallback xmlns="">
           <p:sp>
             <p:nvSpPr>
               <p:cNvPr id="12" name="Textfeld 11"/>
@@ -6159,13 +5935,6 @@
   <p:clrMapOvr>
     <a:masterClrMapping/>
   </p:clrMapOvr>
-  <p:timing>
-    <p:tnLst>
-      <p:par>
-        <p:cTn id="1" dur="indefinite" restart="never" nodeType="tmRoot"/>
-      </p:par>
-    </p:tnLst>
-  </p:timing>
 </p:sld>
 </file>
 
@@ -6207,35 +5976,34 @@
               <a:rPr lang="en-GB" dirty="0"/>
               <a:t>Method</a:t>
             </a:r>
+          </a:p>
+        </p:txBody>
+      </p:sp>
+      <p:sp>
+        <p:nvSpPr>
+          <p:cNvPr id="4" name="Datumsplatzhalter 3"/>
+          <p:cNvSpPr>
+            <a:spLocks noGrp="1"/>
+          </p:cNvSpPr>
+          <p:nvPr>
+            <p:ph type="dt" sz="half" idx="10"/>
+          </p:nvPr>
+        </p:nvSpPr>
+        <p:spPr/>
+        <p:txBody>
+          <a:bodyPr/>
+          <a:lstStyle/>
+          <a:p>
+            <a:r>
+              <a:rPr lang="en-US"/>
+              <a:t>Ganiyu Ibraheem  Philipp Seybold</a:t>
+            </a:r>
             <a:endParaRPr lang="en-GB" dirty="0"/>
           </a:p>
         </p:txBody>
       </p:sp>
       <p:sp>
         <p:nvSpPr>
-          <p:cNvPr id="4" name="Datumsplatzhalter 3"/>
-          <p:cNvSpPr>
-            <a:spLocks noGrp="1"/>
-          </p:cNvSpPr>
-          <p:nvPr>
-            <p:ph type="dt" sz="half" idx="10"/>
-          </p:nvPr>
-        </p:nvSpPr>
-        <p:spPr/>
-        <p:txBody>
-          <a:bodyPr/>
-          <a:lstStyle/>
-          <a:p>
-            <a:r>
-              <a:rPr lang="en-US" smtClean="0"/>
-              <a:t>Ganiyu Ibraheem  Philipp Seybold</a:t>
-            </a:r>
-            <a:endParaRPr lang="en-GB" dirty="0"/>
-          </a:p>
-        </p:txBody>
-      </p:sp>
-      <p:sp>
-        <p:nvSpPr>
           <p:cNvPr id="5" name="Fußzeilenplatzhalter 4"/>
           <p:cNvSpPr>
             <a:spLocks noGrp="1"/>
@@ -6250,10 +6018,9 @@
           <a:lstStyle/>
           <a:p>
             <a:r>
-              <a:rPr lang="en-GB" dirty="0" smtClean="0"/>
+              <a:rPr lang="en-GB" dirty="0"/>
               <a:t>COMP6206 Advanced Computer Vision</a:t>
             </a:r>
-            <a:endParaRPr lang="en-GB" dirty="0"/>
           </a:p>
         </p:txBody>
       </p:sp>
@@ -6310,8 +6077,8 @@
           </a:prstGeom>
         </p:spPr>
       </p:pic>
-      <mc:AlternateContent xmlns:mc="http://schemas.openxmlformats.org/markup-compatibility/2006">
-        <mc:Choice xmlns:a14="http://schemas.microsoft.com/office/drawing/2010/main" Requires="a14">
+      <mc:AlternateContent xmlns:mc="http://schemas.openxmlformats.org/markup-compatibility/2006" xmlns:a14="http://schemas.microsoft.com/office/drawing/2010/main">
+        <mc:Choice Requires="a14">
           <p:sp>
             <p:nvSpPr>
               <p:cNvPr id="15" name="Textfeld 14"/>
@@ -6406,13 +6173,7 @@
                         <a:rPr lang="en-GB" sz="2000" b="0" i="1" smtClean="0">
                           <a:latin typeface="Cambria Math" panose="02040503050406030204" pitchFamily="18" charset="0"/>
                         </a:rPr>
-                        <m:t>= </m:t>
-                      </m:r>
-                      <m:r>
-                        <a:rPr lang="en-GB" sz="2000" b="0" i="1" smtClean="0">
-                          <a:latin typeface="Cambria Math" panose="02040503050406030204" pitchFamily="18" charset="0"/>
-                        </a:rPr>
-                        <m:t>…= </m:t>
+                        <m:t>= …= </m:t>
                       </m:r>
                       <m:r>
                         <a:rPr lang="en-GB" sz="2000" i="1">
@@ -6622,7 +6383,7 @@
                     </m:oMath>
                   </m:oMathPara>
                 </a14:m>
-                <a:endParaRPr lang="en-GB" sz="2000" b="0" i="1" dirty="0" smtClean="0">
+                <a:endParaRPr lang="en-GB" sz="2000" b="0" i="1" dirty="0">
                   <a:latin typeface="Cambria Math" panose="02040503050406030204" pitchFamily="18" charset="0"/>
                 </a:endParaRPr>
               </a:p>
@@ -6632,15 +6393,9 @@
                   <a:rPr lang="en-GB" sz="900" i="1" dirty="0">
                     <a:latin typeface="Cambria Math" panose="02040503050406030204" pitchFamily="18" charset="0"/>
                   </a:rPr>
-                  <a:t> </a:t>
+                  <a:t>  </a:t>
                 </a:r>
-                <a:r>
-                  <a:rPr lang="en-GB" sz="900" i="1" dirty="0" smtClean="0">
-                    <a:latin typeface="Cambria Math" panose="02040503050406030204" pitchFamily="18" charset="0"/>
-                  </a:rPr>
-                  <a:t> </a:t>
-                </a:r>
-                <a:endParaRPr lang="en-GB" sz="800" b="0" i="1" dirty="0" smtClean="0">
+                <a:endParaRPr lang="en-GB" sz="800" b="0" i="1" dirty="0">
                   <a:latin typeface="Cambria Math" panose="02040503050406030204" pitchFamily="18" charset="0"/>
                 </a:endParaRPr>
               </a:p>
@@ -6727,7 +6482,7 @@
             </p:txBody>
           </p:sp>
         </mc:Choice>
-        <mc:Fallback>
+        <mc:Fallback xmlns="">
           <p:sp>
             <p:nvSpPr>
               <p:cNvPr id="15" name="Textfeld 14"/>
@@ -6776,13 +6531,6 @@
   <p:clrMapOvr>
     <a:masterClrMapping/>
   </p:clrMapOvr>
-  <p:timing>
-    <p:tnLst>
-      <p:par>
-        <p:cTn id="1" dur="indefinite" restart="never" nodeType="tmRoot"/>
-      </p:par>
-    </p:tnLst>
-  </p:timing>
 </p:sld>
 </file>
 
@@ -6821,10 +6569,9 @@
           <a:lstStyle/>
           <a:p>
             <a:r>
-              <a:rPr lang="en-GB" dirty="0" smtClean="0"/>
+              <a:rPr lang="en-GB" dirty="0"/>
               <a:t>Method Application</a:t>
             </a:r>
-            <a:endParaRPr lang="en-GB" dirty="0"/>
           </a:p>
         </p:txBody>
       </p:sp>
@@ -7263,22 +7010,14 @@
                 </a:r>
                 <a:r>
                   <a:rPr lang="en-GB" dirty="0"/>
-                  <a:t>(represents the amount of energy that is exerted on a pixel if it moved around, like in physics … ) (picture </a:t>
-                </a:r>
-                <a:r>
-                  <a:rPr lang="en-GB" dirty="0" smtClean="0"/>
-                  <a:t>4)</a:t>
+                  <a:t>(represents the amount of energy that is exerted on a pixel if it moved around, like in physics … ) (picture 4)</a:t>
                 </a:r>
               </a:p>
               <a:p>
                 <a:pPr lvl="1"/>
                 <a:r>
-                  <a:rPr lang="en-GB" dirty="0" smtClean="0"/>
-                  <a:t>To </a:t>
-                </a:r>
-                <a:r>
                   <a:rPr lang="en-GB" dirty="0"/>
-                  <a:t>discover the force field lines: generate an array of unit value mobile test pixels arranged in  a closed loop surrounding the ear, which are then solely being ‘pulled’ by the force (gravity) fields of the ear’s pixels vectors so that their trajectory form the field line until they reached an extremum in the potential energy surface: </a:t>
+                  <a:t>To discover the force field lines: generate an array of unit value mobile test pixels arranged in  a closed loop surrounding the ear, which are then solely being ‘pulled’ by the force (gravity) fields of the ear’s pixels vectors so that their trajectory form the field line until they reached an extremum in the potential energy surface: </a:t>
                 </a:r>
                 <a:br>
                   <a:rPr lang="en-GB" dirty="0"/>
@@ -7292,20 +7031,15 @@
                 </a:br>
                 <a:r>
                   <a:rPr lang="en-GB" dirty="0"/>
-                  <a:t>(picture 1, 2 &amp; 3</a:t>
-                </a:r>
-                <a:r>
-                  <a:rPr lang="en-GB" dirty="0" smtClean="0"/>
-                  <a:t>)</a:t>
+                  <a:t>(picture 1, 2 &amp; 3)</a:t>
                 </a:r>
               </a:p>
               <a:p>
                 <a:pPr lvl="1"/>
                 <a:r>
-                  <a:rPr lang="en-GB" dirty="0" smtClean="0"/>
+                  <a:rPr lang="en-GB" dirty="0"/>
                   <a:t>….</a:t>
                 </a:r>
-                <a:endParaRPr lang="en-GB" dirty="0"/>
               </a:p>
             </p:txBody>
           </p:sp>
@@ -7364,7 +7098,7 @@
           <a:lstStyle/>
           <a:p>
             <a:r>
-              <a:rPr lang="en-US" smtClean="0"/>
+              <a:rPr lang="en-US"/>
               <a:t>Ganiyu Ibraheem  Philipp Seybold</a:t>
             </a:r>
             <a:endParaRPr lang="en-GB" dirty="0"/>
@@ -7387,10 +7121,9 @@
           <a:lstStyle/>
           <a:p>
             <a:r>
-              <a:rPr lang="en-GB" smtClean="0"/>
+              <a:rPr lang="en-GB"/>
               <a:t>COMP6206 Advanced Computer Vision</a:t>
             </a:r>
-            <a:endParaRPr lang="en-GB"/>
           </a:p>
         </p:txBody>
       </p:sp>
@@ -7427,13 +7160,6 @@
   <p:clrMapOvr>
     <a:masterClrMapping/>
   </p:clrMapOvr>
-  <p:timing>
-    <p:tnLst>
-      <p:par>
-        <p:cTn id="1" dur="indefinite" restart="never" nodeType="tmRoot"/>
-      </p:par>
-    </p:tnLst>
-  </p:timing>
 </p:sld>
 </file>
 
@@ -7472,75 +7198,73 @@
           <a:lstStyle/>
           <a:p>
             <a:r>
-              <a:rPr lang="en-GB" dirty="0" smtClean="0"/>
+              <a:rPr lang="en-GB" dirty="0"/>
               <a:t>Demonstration</a:t>
             </a:r>
+          </a:p>
+        </p:txBody>
+      </p:sp>
+      <p:sp>
+        <p:nvSpPr>
+          <p:cNvPr id="3" name="Inhaltsplatzhalter 2"/>
+          <p:cNvSpPr>
+            <a:spLocks noGrp="1"/>
+          </p:cNvSpPr>
+          <p:nvPr>
+            <p:ph idx="1"/>
+          </p:nvPr>
+        </p:nvSpPr>
+        <p:spPr/>
+        <p:txBody>
+          <a:bodyPr/>
+          <a:lstStyle/>
+          <a:p>
+            <a:r>
+              <a:rPr lang="en-GB" dirty="0"/>
+              <a:t>Our own ears pictures etc. like in method application, e.g. force field lines, moving test pixel initialisation, peaks/wells, edges (compare to </a:t>
+            </a:r>
+            <a:r>
+              <a:rPr lang="en-GB" dirty="0" err="1"/>
+              <a:t>sobel</a:t>
+            </a:r>
+            <a:r>
+              <a:rPr lang="en-GB" dirty="0"/>
+              <a:t>?), potential energy patterns</a:t>
+            </a:r>
+          </a:p>
+          <a:p>
+            <a:r>
+              <a:rPr lang="en-GB" dirty="0"/>
+              <a:t>Live demo with camera</a:t>
+            </a:r>
+          </a:p>
+        </p:txBody>
+      </p:sp>
+      <p:sp>
+        <p:nvSpPr>
+          <p:cNvPr id="4" name="Datumsplatzhalter 3"/>
+          <p:cNvSpPr>
+            <a:spLocks noGrp="1"/>
+          </p:cNvSpPr>
+          <p:nvPr>
+            <p:ph type="dt" sz="half" idx="10"/>
+          </p:nvPr>
+        </p:nvSpPr>
+        <p:spPr/>
+        <p:txBody>
+          <a:bodyPr/>
+          <a:lstStyle/>
+          <a:p>
+            <a:r>
+              <a:rPr lang="en-US"/>
+              <a:t>Ganiyu Ibraheem  Philipp Seybold</a:t>
+            </a:r>
             <a:endParaRPr lang="en-GB" dirty="0"/>
           </a:p>
         </p:txBody>
       </p:sp>
       <p:sp>
         <p:nvSpPr>
-          <p:cNvPr id="3" name="Inhaltsplatzhalter 2"/>
-          <p:cNvSpPr>
-            <a:spLocks noGrp="1"/>
-          </p:cNvSpPr>
-          <p:nvPr>
-            <p:ph idx="1"/>
-          </p:nvPr>
-        </p:nvSpPr>
-        <p:spPr/>
-        <p:txBody>
-          <a:bodyPr/>
-          <a:lstStyle/>
-          <a:p>
-            <a:r>
-              <a:rPr lang="en-GB" dirty="0" smtClean="0"/>
-              <a:t>Our own ears pictures etc. like in method application, e.g. force field lines, moving test pixel initialisation, peaks/wells, edges (compare to </a:t>
-            </a:r>
-            <a:r>
-              <a:rPr lang="en-GB" dirty="0" err="1" smtClean="0"/>
-              <a:t>sobel</a:t>
-            </a:r>
-            <a:r>
-              <a:rPr lang="en-GB" dirty="0" smtClean="0"/>
-              <a:t>?), potential energy patterns</a:t>
-            </a:r>
-          </a:p>
-          <a:p>
-            <a:r>
-              <a:rPr lang="en-GB" dirty="0" smtClean="0"/>
-              <a:t>Live demo with camera</a:t>
-            </a:r>
-            <a:endParaRPr lang="en-GB" dirty="0"/>
-          </a:p>
-        </p:txBody>
-      </p:sp>
-      <p:sp>
-        <p:nvSpPr>
-          <p:cNvPr id="4" name="Datumsplatzhalter 3"/>
-          <p:cNvSpPr>
-            <a:spLocks noGrp="1"/>
-          </p:cNvSpPr>
-          <p:nvPr>
-            <p:ph type="dt" sz="half" idx="10"/>
-          </p:nvPr>
-        </p:nvSpPr>
-        <p:spPr/>
-        <p:txBody>
-          <a:bodyPr/>
-          <a:lstStyle/>
-          <a:p>
-            <a:r>
-              <a:rPr lang="en-US" smtClean="0"/>
-              <a:t>Ganiyu Ibraheem  Philipp Seybold</a:t>
-            </a:r>
-            <a:endParaRPr lang="en-GB" dirty="0"/>
-          </a:p>
-        </p:txBody>
-      </p:sp>
-      <p:sp>
-        <p:nvSpPr>
           <p:cNvPr id="5" name="Fußzeilenplatzhalter 4"/>
           <p:cNvSpPr>
             <a:spLocks noGrp="1"/>
@@ -7555,10 +7279,9 @@
           <a:lstStyle/>
           <a:p>
             <a:r>
-              <a:rPr lang="en-GB" smtClean="0"/>
+              <a:rPr lang="en-GB"/>
               <a:t>COMP6206 Advanced Computer Vision</a:t>
             </a:r>
-            <a:endParaRPr lang="en-GB"/>
           </a:p>
         </p:txBody>
       </p:sp>
@@ -7595,13 +7318,6 @@
   <p:clrMapOvr>
     <a:masterClrMapping/>
   </p:clrMapOvr>
-  <p:timing>
-    <p:tnLst>
-      <p:par>
-        <p:cTn id="1" dur="indefinite" restart="never" nodeType="tmRoot"/>
-      </p:par>
-    </p:tnLst>
-  </p:timing>
 </p:sld>
 </file>
 
@@ -7640,10 +7356,9 @@
           <a:lstStyle/>
           <a:p>
             <a:r>
-              <a:rPr lang="en-GB" dirty="0" smtClean="0"/>
+              <a:rPr lang="en-GB" dirty="0"/>
               <a:t>Result</a:t>
             </a:r>
-            <a:endParaRPr lang="en-GB" dirty="0"/>
           </a:p>
         </p:txBody>
       </p:sp>
@@ -7660,7 +7375,7 @@
         <p:spPr/>
         <p:txBody>
           <a:bodyPr>
-            <a:normAutofit fontScale="92500" lnSpcReduction="10000"/>
+            <a:normAutofit fontScale="85000" lnSpcReduction="20000"/>
           </a:bodyPr>
           <a:lstStyle/>
           <a:p>
@@ -7706,6 +7421,32 @@
             </a:r>
           </a:p>
           <a:p>
+            <a:pPr lvl="1"/>
+            <a:r>
+              <a:rPr lang="en-GB" dirty="0"/>
+              <a:t>The Force Field Transforms </a:t>
+            </a:r>
+            <a:r>
+              <a:rPr lang="en-GB"/>
+              <a:t>are invertible</a:t>
+            </a:r>
+            <a:endParaRPr lang="en-GB" dirty="0"/>
+          </a:p>
+          <a:p>
+            <a:pPr lvl="1"/>
+            <a:r>
+              <a:rPr lang="en-GB" dirty="0"/>
+              <a:t>It is scale invariant and tolerant to low noise</a:t>
+            </a:r>
+          </a:p>
+          <a:p>
+            <a:pPr lvl="2"/>
+            <a:r>
+              <a:rPr lang="en-GB" dirty="0"/>
+              <a:t>Also invariant to different changes in illumination</a:t>
+            </a:r>
+          </a:p>
+          <a:p>
             <a:pPr lvl="0"/>
             <a:r>
               <a:rPr lang="en-GB" dirty="0"/>
@@ -7766,7 +7507,7 @@
           <a:lstStyle/>
           <a:p>
             <a:r>
-              <a:rPr lang="en-US" smtClean="0"/>
+              <a:rPr lang="en-US"/>
               <a:t>Ganiyu Ibraheem  Philipp Seybold</a:t>
             </a:r>
             <a:endParaRPr lang="en-GB" dirty="0"/>
@@ -7789,10 +7530,9 @@
           <a:lstStyle/>
           <a:p>
             <a:r>
-              <a:rPr lang="en-GB" smtClean="0"/>
+              <a:rPr lang="en-GB"/>
               <a:t>COMP6206 Advanced Computer Vision</a:t>
             </a:r>
-            <a:endParaRPr lang="en-GB"/>
           </a:p>
         </p:txBody>
       </p:sp>
@@ -7829,13 +7569,6 @@
   <p:clrMapOvr>
     <a:masterClrMapping/>
   </p:clrMapOvr>
-  <p:timing>
-    <p:tnLst>
-      <p:par>
-        <p:cTn id="1" dur="indefinite" restart="never" nodeType="tmRoot"/>
-      </p:par>
-    </p:tnLst>
-  </p:timing>
 </p:sld>
 </file>
 

</xml_diff>